<commit_message>
Actualizo ppt arquitectura con imágenes con derechos
</commit_message>
<xml_diff>
--- a/PHASE4_Architecture/docs/3.1 Architecure management.pptx
+++ b/PHASE4_Architecture/docs/3.1 Architecure management.pptx
@@ -5,10 +5,10 @@
     <p:sldMasterId id="2147483648" r:id="rId1"/>
   </p:sldMasterIdLst>
   <p:notesMasterIdLst>
-    <p:notesMasterId r:id="rId27"/>
+    <p:notesMasterId r:id="rId26"/>
   </p:notesMasterIdLst>
   <p:handoutMasterIdLst>
-    <p:handoutMasterId r:id="rId28"/>
+    <p:handoutMasterId r:id="rId27"/>
   </p:handoutMasterIdLst>
   <p:sldIdLst>
     <p:sldId id="492" r:id="rId2"/>
@@ -22,20 +22,19 @@
     <p:sldId id="550" r:id="rId10"/>
     <p:sldId id="526" r:id="rId11"/>
     <p:sldId id="536" r:id="rId12"/>
-    <p:sldId id="552" r:id="rId13"/>
-    <p:sldId id="527" r:id="rId14"/>
-    <p:sldId id="537" r:id="rId15"/>
-    <p:sldId id="601" r:id="rId16"/>
-    <p:sldId id="565" r:id="rId17"/>
-    <p:sldId id="566" r:id="rId18"/>
-    <p:sldId id="568" r:id="rId19"/>
-    <p:sldId id="573" r:id="rId20"/>
-    <p:sldId id="570" r:id="rId21"/>
-    <p:sldId id="574" r:id="rId22"/>
-    <p:sldId id="577" r:id="rId23"/>
-    <p:sldId id="612" r:id="rId24"/>
-    <p:sldId id="501" r:id="rId25"/>
-    <p:sldId id="611" r:id="rId26"/>
+    <p:sldId id="613" r:id="rId13"/>
+    <p:sldId id="537" r:id="rId14"/>
+    <p:sldId id="601" r:id="rId15"/>
+    <p:sldId id="565" r:id="rId16"/>
+    <p:sldId id="566" r:id="rId17"/>
+    <p:sldId id="568" r:id="rId18"/>
+    <p:sldId id="573" r:id="rId19"/>
+    <p:sldId id="570" r:id="rId20"/>
+    <p:sldId id="574" r:id="rId21"/>
+    <p:sldId id="577" r:id="rId22"/>
+    <p:sldId id="612" r:id="rId23"/>
+    <p:sldId id="501" r:id="rId24"/>
+    <p:sldId id="611" r:id="rId25"/>
   </p:sldIdLst>
   <p:sldSz cx="9906000" cy="6858000" type="A4"/>
   <p:notesSz cx="6797675" cy="9926638"/>
@@ -4804,209 +4803,6 @@
           </a:p>
         </p:txBody>
       </p:sp>
-      <p:pic>
-        <p:nvPicPr>
-          <p:cNvPr id="6" name="Picture 2" descr="Common Washing Machine Problems And Cures">
-            <a:extLst>
-              <a:ext uri="{FF2B5EF4-FFF2-40B4-BE49-F238E27FC236}">
-                <a16:creationId xmlns:a16="http://schemas.microsoft.com/office/drawing/2014/main" id="{5B142C75-213F-E8D9-8840-A0DCF47F6CE8}"/>
-              </a:ext>
-            </a:extLst>
-          </p:cNvPr>
-          <p:cNvPicPr>
-            <a:picLocks noChangeAspect="1" noChangeArrowheads="1"/>
-          </p:cNvPicPr>
-          <p:nvPr/>
-        </p:nvPicPr>
-        <p:blipFill>
-          <a:blip r:embed="rId2">
-            <a:extLst>
-              <a:ext uri="{28A0092B-C50C-407E-A947-70E740481C1C}">
-                <a14:useLocalDpi xmlns:a14="http://schemas.microsoft.com/office/drawing/2010/main"/>
-              </a:ext>
-            </a:extLst>
-          </a:blip>
-          <a:srcRect/>
-          <a:stretch>
-            <a:fillRect/>
-          </a:stretch>
-        </p:blipFill>
-        <p:spPr bwMode="auto">
-          <a:xfrm>
-            <a:off x="2701757" y="2068945"/>
-            <a:ext cx="3686972" cy="4011170"/>
-          </a:xfrm>
-          <a:prstGeom prst="rect">
-            <a:avLst/>
-          </a:prstGeom>
-          <a:noFill/>
-          <a:extLst>
-            <a:ext uri="{909E8E84-426E-40DD-AFC4-6F175D3DCCD1}">
-              <a14:hiddenFill xmlns:a14="http://schemas.microsoft.com/office/drawing/2010/main">
-                <a:solidFill>
-                  <a:srgbClr val="FFFFFF"/>
-                </a:solidFill>
-              </a14:hiddenFill>
-            </a:ext>
-          </a:extLst>
-        </p:spPr>
-      </p:pic>
-      <p:sp>
-        <p:nvSpPr>
-          <p:cNvPr id="8" name="CuadroTexto 7">
-            <a:extLst>
-              <a:ext uri="{FF2B5EF4-FFF2-40B4-BE49-F238E27FC236}">
-                <a16:creationId xmlns:a16="http://schemas.microsoft.com/office/drawing/2014/main" id="{ED0B9730-954D-8B82-A0A0-F3DC960B2276}"/>
-              </a:ext>
-            </a:extLst>
-          </p:cNvPr>
-          <p:cNvSpPr txBox="1"/>
-          <p:nvPr/>
-        </p:nvSpPr>
-        <p:spPr>
-          <a:xfrm>
-            <a:off x="2701757" y="6080115"/>
-            <a:ext cx="4043538" cy="225767"/>
-          </a:xfrm>
-          <a:prstGeom prst="rect">
-            <a:avLst/>
-          </a:prstGeom>
-          <a:noFill/>
-        </p:spPr>
-        <p:txBody>
-          <a:bodyPr wrap="square">
-            <a:spAutoFit/>
-          </a:bodyPr>
-          <a:lstStyle>
-            <a:defPPr>
-              <a:defRPr lang="en-US"/>
-            </a:defPPr>
-            <a:lvl1pPr>
-              <a:defRPr sz="1050" i="1">
-                <a:solidFill>
-                  <a:schemeClr val="accent2"/>
-                </a:solidFill>
-                <a:latin typeface="Arial Nova Light" panose="020B0304020202020204" pitchFamily="34" charset="0"/>
-                <a:cs typeface="Arial" panose="020B0604020202020204" pitchFamily="34" charset="0"/>
-              </a:defRPr>
-            </a:lvl1pPr>
-            <a:lvl2pPr>
-              <a:buSzPts val="1400"/>
-              <a:buNone/>
-              <a:defRPr sz="1800">
-                <a:solidFill>
-                  <a:schemeClr val="dk1"/>
-                </a:solidFill>
-                <a:latin typeface="Calibri"/>
-                <a:ea typeface="Calibri"/>
-                <a:cs typeface="Calibri"/>
-                <a:sym typeface="Calibri"/>
-              </a:defRPr>
-            </a:lvl2pPr>
-            <a:lvl3pPr>
-              <a:buSzPts val="1400"/>
-              <a:buNone/>
-              <a:defRPr sz="1800">
-                <a:solidFill>
-                  <a:schemeClr val="dk1"/>
-                </a:solidFill>
-                <a:latin typeface="Calibri"/>
-                <a:ea typeface="Calibri"/>
-                <a:cs typeface="Calibri"/>
-                <a:sym typeface="Calibri"/>
-              </a:defRPr>
-            </a:lvl3pPr>
-            <a:lvl4pPr>
-              <a:buSzPts val="1400"/>
-              <a:buNone/>
-              <a:defRPr sz="1800">
-                <a:solidFill>
-                  <a:schemeClr val="dk1"/>
-                </a:solidFill>
-                <a:latin typeface="Calibri"/>
-                <a:ea typeface="Calibri"/>
-                <a:cs typeface="Calibri"/>
-                <a:sym typeface="Calibri"/>
-              </a:defRPr>
-            </a:lvl4pPr>
-            <a:lvl5pPr>
-              <a:buSzPts val="1400"/>
-              <a:buNone/>
-              <a:defRPr sz="1800">
-                <a:solidFill>
-                  <a:schemeClr val="dk1"/>
-                </a:solidFill>
-                <a:latin typeface="Calibri"/>
-                <a:ea typeface="Calibri"/>
-                <a:cs typeface="Calibri"/>
-                <a:sym typeface="Calibri"/>
-              </a:defRPr>
-            </a:lvl5pPr>
-            <a:lvl6pPr>
-              <a:buSzPts val="1400"/>
-              <a:buNone/>
-              <a:defRPr sz="1800">
-                <a:solidFill>
-                  <a:schemeClr val="dk1"/>
-                </a:solidFill>
-                <a:latin typeface="Calibri"/>
-                <a:ea typeface="Calibri"/>
-                <a:cs typeface="Calibri"/>
-                <a:sym typeface="Calibri"/>
-              </a:defRPr>
-            </a:lvl6pPr>
-            <a:lvl7pPr>
-              <a:buSzPts val="1400"/>
-              <a:buNone/>
-              <a:defRPr sz="1800">
-                <a:solidFill>
-                  <a:schemeClr val="dk1"/>
-                </a:solidFill>
-                <a:latin typeface="Calibri"/>
-                <a:ea typeface="Calibri"/>
-                <a:cs typeface="Calibri"/>
-                <a:sym typeface="Calibri"/>
-              </a:defRPr>
-            </a:lvl7pPr>
-            <a:lvl8pPr>
-              <a:buSzPts val="1400"/>
-              <a:buNone/>
-              <a:defRPr sz="1800">
-                <a:solidFill>
-                  <a:schemeClr val="dk1"/>
-                </a:solidFill>
-                <a:latin typeface="Calibri"/>
-                <a:ea typeface="Calibri"/>
-                <a:cs typeface="Calibri"/>
-                <a:sym typeface="Calibri"/>
-              </a:defRPr>
-            </a:lvl8pPr>
-            <a:lvl9pPr>
-              <a:buSzPts val="1400"/>
-              <a:buNone/>
-              <a:defRPr sz="1800">
-                <a:solidFill>
-                  <a:schemeClr val="dk1"/>
-                </a:solidFill>
-                <a:latin typeface="Calibri"/>
-                <a:ea typeface="Calibri"/>
-                <a:cs typeface="Calibri"/>
-                <a:sym typeface="Calibri"/>
-              </a:defRPr>
-            </a:lvl9pPr>
-          </a:lstStyle>
-          <a:p>
-            <a:r>
-              <a:rPr lang="es-ES" sz="867" dirty="0" err="1"/>
-              <a:t>Source</a:t>
-            </a:r>
-            <a:r>
-              <a:rPr lang="es-ES" sz="867" dirty="0"/>
-              <a:t>: www.ukwhitegoods.co.uk/2967-washing-machine-a-washer-dryer-top-</a:t>
-            </a:r>
-          </a:p>
-        </p:txBody>
-      </p:sp>
       <p:sp>
         <p:nvSpPr>
           <p:cNvPr id="7" name="Rectángulo 6">
@@ -5054,12 +4850,589 @@
                 <a:latin typeface="Arial Nova Light" panose="020B0304020202020204" pitchFamily="34" charset="0"/>
                 <a:cs typeface="Arial" panose="020B0604020202020204" pitchFamily="34" charset="0"/>
               </a:rPr>
-              <a:t>Example: washing machine</a:t>
+              <a:t>Example: light bulb</a:t>
             </a:r>
             <a:endParaRPr lang="es-ES" sz="1517" dirty="0">
               <a:solidFill>
                 <a:srgbClr val="004851"/>
               </a:solidFill>
+            </a:endParaRPr>
+          </a:p>
+        </p:txBody>
+      </p:sp>
+      <p:pic>
+        <p:nvPicPr>
+          <p:cNvPr id="12" name="Imagen 11">
+            <a:extLst>
+              <a:ext uri="{FF2B5EF4-FFF2-40B4-BE49-F238E27FC236}">
+                <a16:creationId xmlns:a16="http://schemas.microsoft.com/office/drawing/2014/main" id="{75FFBE09-71FD-26C6-C86C-A0FF6A6FA755}"/>
+              </a:ext>
+            </a:extLst>
+          </p:cNvPr>
+          <p:cNvPicPr>
+            <a:picLocks noChangeAspect="1"/>
+          </p:cNvPicPr>
+          <p:nvPr/>
+        </p:nvPicPr>
+        <p:blipFill>
+          <a:blip r:embed="rId2"/>
+          <a:stretch>
+            <a:fillRect/>
+          </a:stretch>
+        </p:blipFill>
+        <p:spPr>
+          <a:xfrm>
+            <a:off x="2351585" y="2015806"/>
+            <a:ext cx="5175481" cy="3881611"/>
+          </a:xfrm>
+          <a:prstGeom prst="rect">
+            <a:avLst/>
+          </a:prstGeom>
+        </p:spPr>
+      </p:pic>
+      <p:sp>
+        <p:nvSpPr>
+          <p:cNvPr id="18" name="CuadroTexto 17">
+            <a:extLst>
+              <a:ext uri="{FF2B5EF4-FFF2-40B4-BE49-F238E27FC236}">
+                <a16:creationId xmlns:a16="http://schemas.microsoft.com/office/drawing/2014/main" id="{B2DF28D6-0FE6-7BA9-A87F-9027F59D4291}"/>
+              </a:ext>
+            </a:extLst>
+          </p:cNvPr>
+          <p:cNvSpPr txBox="1"/>
+          <p:nvPr/>
+        </p:nvSpPr>
+        <p:spPr>
+          <a:xfrm>
+            <a:off x="1096851" y="4766944"/>
+            <a:ext cx="1106054" cy="425822"/>
+          </a:xfrm>
+          <a:prstGeom prst="rect">
+            <a:avLst/>
+          </a:prstGeom>
+          <a:noFill/>
+        </p:spPr>
+        <p:txBody>
+          <a:bodyPr wrap="square">
+            <a:spAutoFit/>
+          </a:bodyPr>
+          <a:lstStyle/>
+          <a:p>
+            <a:r>
+              <a:rPr lang="en-GB" sz="2167" dirty="0">
+                <a:solidFill>
+                  <a:srgbClr val="004851"/>
+                </a:solidFill>
+                <a:latin typeface="Arial Nova Light" panose="020B0304020202020204" pitchFamily="34" charset="0"/>
+                <a:cs typeface="Arial" panose="020B0604020202020204" pitchFamily="34" charset="0"/>
+              </a:rPr>
+              <a:t>socket</a:t>
+            </a:r>
+          </a:p>
+        </p:txBody>
+      </p:sp>
+      <p:cxnSp>
+        <p:nvCxnSpPr>
+          <p:cNvPr id="20" name="Conector recto 19">
+            <a:extLst>
+              <a:ext uri="{FF2B5EF4-FFF2-40B4-BE49-F238E27FC236}">
+                <a16:creationId xmlns:a16="http://schemas.microsoft.com/office/drawing/2014/main" id="{2ACE9B1D-71D4-8AD7-2FE2-FA3B27DF9205}"/>
+              </a:ext>
+            </a:extLst>
+          </p:cNvPr>
+          <p:cNvCxnSpPr>
+            <a:stCxn id="18" idx="3"/>
+          </p:cNvCxnSpPr>
+          <p:nvPr/>
+        </p:nvCxnSpPr>
+        <p:spPr>
+          <a:xfrm>
+            <a:off x="2202905" y="4979855"/>
+            <a:ext cx="410986" cy="212911"/>
+          </a:xfrm>
+          <a:prstGeom prst="line">
+            <a:avLst/>
+          </a:prstGeom>
+        </p:spPr>
+        <p:style>
+          <a:lnRef idx="2">
+            <a:schemeClr val="accent1"/>
+          </a:lnRef>
+          <a:fillRef idx="0">
+            <a:schemeClr val="accent1"/>
+          </a:fillRef>
+          <a:effectRef idx="1">
+            <a:schemeClr val="accent1"/>
+          </a:effectRef>
+          <a:fontRef idx="minor">
+            <a:schemeClr val="tx1"/>
+          </a:fontRef>
+        </p:style>
+      </p:cxnSp>
+      <p:sp>
+        <p:nvSpPr>
+          <p:cNvPr id="21" name="CuadroTexto 20">
+            <a:extLst>
+              <a:ext uri="{FF2B5EF4-FFF2-40B4-BE49-F238E27FC236}">
+                <a16:creationId xmlns:a16="http://schemas.microsoft.com/office/drawing/2014/main" id="{CD9B7AE9-7C67-AA8E-50E4-53F1B4B01DA4}"/>
+              </a:ext>
+            </a:extLst>
+          </p:cNvPr>
+          <p:cNvSpPr txBox="1"/>
+          <p:nvPr/>
+        </p:nvSpPr>
+        <p:spPr>
+          <a:xfrm>
+            <a:off x="4008680" y="2226180"/>
+            <a:ext cx="1106054" cy="425822"/>
+          </a:xfrm>
+          <a:prstGeom prst="rect">
+            <a:avLst/>
+          </a:prstGeom>
+          <a:noFill/>
+        </p:spPr>
+        <p:txBody>
+          <a:bodyPr wrap="square">
+            <a:spAutoFit/>
+          </a:bodyPr>
+          <a:lstStyle/>
+          <a:p>
+            <a:r>
+              <a:rPr lang="en-GB" sz="2167" dirty="0" err="1">
+                <a:solidFill>
+                  <a:srgbClr val="004851"/>
+                </a:solidFill>
+                <a:latin typeface="Arial Nova Light" panose="020B0304020202020204" pitchFamily="34" charset="0"/>
+                <a:cs typeface="Arial" panose="020B0604020202020204" pitchFamily="34" charset="0"/>
+              </a:rPr>
+              <a:t>leds</a:t>
+            </a:r>
+            <a:endParaRPr lang="en-GB" sz="2167" dirty="0">
+              <a:solidFill>
+                <a:srgbClr val="004851"/>
+              </a:solidFill>
+              <a:latin typeface="Arial Nova Light" panose="020B0304020202020204" pitchFamily="34" charset="0"/>
+              <a:cs typeface="Arial" panose="020B0604020202020204" pitchFamily="34" charset="0"/>
+            </a:endParaRPr>
+          </a:p>
+        </p:txBody>
+      </p:sp>
+      <p:cxnSp>
+        <p:nvCxnSpPr>
+          <p:cNvPr id="22" name="Conector recto 21">
+            <a:extLst>
+              <a:ext uri="{FF2B5EF4-FFF2-40B4-BE49-F238E27FC236}">
+                <a16:creationId xmlns:a16="http://schemas.microsoft.com/office/drawing/2014/main" id="{C17C6B17-0B69-3397-771B-97FE0C6E94BA}"/>
+              </a:ext>
+            </a:extLst>
+          </p:cNvPr>
+          <p:cNvCxnSpPr>
+            <a:cxnSpLocks/>
+          </p:cNvCxnSpPr>
+          <p:nvPr/>
+        </p:nvCxnSpPr>
+        <p:spPr>
+          <a:xfrm>
+            <a:off x="4733832" y="2472496"/>
+            <a:ext cx="761804" cy="340290"/>
+          </a:xfrm>
+          <a:prstGeom prst="line">
+            <a:avLst/>
+          </a:prstGeom>
+        </p:spPr>
+        <p:style>
+          <a:lnRef idx="2">
+            <a:schemeClr val="accent1"/>
+          </a:lnRef>
+          <a:fillRef idx="0">
+            <a:schemeClr val="accent1"/>
+          </a:fillRef>
+          <a:effectRef idx="1">
+            <a:schemeClr val="accent1"/>
+          </a:effectRef>
+          <a:fontRef idx="minor">
+            <a:schemeClr val="tx1"/>
+          </a:fontRef>
+        </p:style>
+      </p:cxnSp>
+      <p:sp>
+        <p:nvSpPr>
+          <p:cNvPr id="24" name="CuadroTexto 23">
+            <a:extLst>
+              <a:ext uri="{FF2B5EF4-FFF2-40B4-BE49-F238E27FC236}">
+                <a16:creationId xmlns:a16="http://schemas.microsoft.com/office/drawing/2014/main" id="{3837AAF6-F0A9-70A0-B490-E6EC14786BA6}"/>
+              </a:ext>
+            </a:extLst>
+          </p:cNvPr>
+          <p:cNvSpPr txBox="1"/>
+          <p:nvPr/>
+        </p:nvSpPr>
+        <p:spPr>
+          <a:xfrm>
+            <a:off x="2202905" y="2949148"/>
+            <a:ext cx="2184302" cy="425822"/>
+          </a:xfrm>
+          <a:prstGeom prst="rect">
+            <a:avLst/>
+          </a:prstGeom>
+          <a:noFill/>
+        </p:spPr>
+        <p:txBody>
+          <a:bodyPr wrap="square">
+            <a:spAutoFit/>
+          </a:bodyPr>
+          <a:lstStyle/>
+          <a:p>
+            <a:r>
+              <a:rPr lang="en-GB" sz="2167" dirty="0">
+                <a:solidFill>
+                  <a:srgbClr val="004851"/>
+                </a:solidFill>
+                <a:latin typeface="Arial Nova Light" panose="020B0304020202020204" pitchFamily="34" charset="0"/>
+                <a:cs typeface="Arial" panose="020B0604020202020204" pitchFamily="34" charset="0"/>
+              </a:rPr>
+              <a:t>electronics</a:t>
+            </a:r>
+          </a:p>
+        </p:txBody>
+      </p:sp>
+      <p:cxnSp>
+        <p:nvCxnSpPr>
+          <p:cNvPr id="25" name="Conector recto 24">
+            <a:extLst>
+              <a:ext uri="{FF2B5EF4-FFF2-40B4-BE49-F238E27FC236}">
+                <a16:creationId xmlns:a16="http://schemas.microsoft.com/office/drawing/2014/main" id="{F704B35F-FB47-E486-612E-D1EB2D977658}"/>
+              </a:ext>
+            </a:extLst>
+          </p:cNvPr>
+          <p:cNvCxnSpPr>
+            <a:cxnSpLocks/>
+          </p:cNvCxnSpPr>
+          <p:nvPr/>
+        </p:nvCxnSpPr>
+        <p:spPr>
+          <a:xfrm>
+            <a:off x="3633326" y="3160563"/>
+            <a:ext cx="975584" cy="511553"/>
+          </a:xfrm>
+          <a:prstGeom prst="line">
+            <a:avLst/>
+          </a:prstGeom>
+        </p:spPr>
+        <p:style>
+          <a:lnRef idx="2">
+            <a:schemeClr val="accent1"/>
+          </a:lnRef>
+          <a:fillRef idx="0">
+            <a:schemeClr val="accent1"/>
+          </a:fillRef>
+          <a:effectRef idx="1">
+            <a:schemeClr val="accent1"/>
+          </a:effectRef>
+          <a:fontRef idx="minor">
+            <a:schemeClr val="tx1"/>
+          </a:fontRef>
+        </p:style>
+      </p:cxnSp>
+      <p:sp>
+        <p:nvSpPr>
+          <p:cNvPr id="27" name="CuadroTexto 26">
+            <a:extLst>
+              <a:ext uri="{FF2B5EF4-FFF2-40B4-BE49-F238E27FC236}">
+                <a16:creationId xmlns:a16="http://schemas.microsoft.com/office/drawing/2014/main" id="{E8255A12-F0B6-2FDA-94A7-8639600518F2}"/>
+              </a:ext>
+            </a:extLst>
+          </p:cNvPr>
+          <p:cNvSpPr txBox="1"/>
+          <p:nvPr/>
+        </p:nvSpPr>
+        <p:spPr>
+          <a:xfrm>
+            <a:off x="1649878" y="3706552"/>
+            <a:ext cx="2184302" cy="425822"/>
+          </a:xfrm>
+          <a:prstGeom prst="rect">
+            <a:avLst/>
+          </a:prstGeom>
+          <a:noFill/>
+        </p:spPr>
+        <p:txBody>
+          <a:bodyPr wrap="square">
+            <a:spAutoFit/>
+          </a:bodyPr>
+          <a:lstStyle/>
+          <a:p>
+            <a:r>
+              <a:rPr lang="en-GB" sz="2167" dirty="0">
+                <a:solidFill>
+                  <a:srgbClr val="004851"/>
+                </a:solidFill>
+                <a:latin typeface="Arial Nova Light" panose="020B0304020202020204" pitchFamily="34" charset="0"/>
+                <a:cs typeface="Arial" panose="020B0604020202020204" pitchFamily="34" charset="0"/>
+              </a:rPr>
+              <a:t>case</a:t>
+            </a:r>
+          </a:p>
+        </p:txBody>
+      </p:sp>
+      <p:cxnSp>
+        <p:nvCxnSpPr>
+          <p:cNvPr id="28" name="Conector recto 27">
+            <a:extLst>
+              <a:ext uri="{FF2B5EF4-FFF2-40B4-BE49-F238E27FC236}">
+                <a16:creationId xmlns:a16="http://schemas.microsoft.com/office/drawing/2014/main" id="{F7C484A7-F2B0-CC93-9803-F114A9034E4B}"/>
+              </a:ext>
+            </a:extLst>
+          </p:cNvPr>
+          <p:cNvCxnSpPr>
+            <a:cxnSpLocks/>
+          </p:cNvCxnSpPr>
+          <p:nvPr/>
+        </p:nvCxnSpPr>
+        <p:spPr>
+          <a:xfrm>
+            <a:off x="2399096" y="3958920"/>
+            <a:ext cx="1119959" cy="169237"/>
+          </a:xfrm>
+          <a:prstGeom prst="line">
+            <a:avLst/>
+          </a:prstGeom>
+        </p:spPr>
+        <p:style>
+          <a:lnRef idx="2">
+            <a:schemeClr val="accent1"/>
+          </a:lnRef>
+          <a:fillRef idx="0">
+            <a:schemeClr val="accent1"/>
+          </a:fillRef>
+          <a:effectRef idx="1">
+            <a:schemeClr val="accent1"/>
+          </a:effectRef>
+          <a:fontRef idx="minor">
+            <a:schemeClr val="tx1"/>
+          </a:fontRef>
+        </p:style>
+      </p:cxnSp>
+      <p:sp>
+        <p:nvSpPr>
+          <p:cNvPr id="31" name="CuadroTexto 30">
+            <a:extLst>
+              <a:ext uri="{FF2B5EF4-FFF2-40B4-BE49-F238E27FC236}">
+                <a16:creationId xmlns:a16="http://schemas.microsoft.com/office/drawing/2014/main" id="{AF48C14A-4133-F736-A110-582A90359CD4}"/>
+              </a:ext>
+            </a:extLst>
+          </p:cNvPr>
+          <p:cNvSpPr txBox="1"/>
+          <p:nvPr/>
+        </p:nvSpPr>
+        <p:spPr>
+          <a:xfrm>
+            <a:off x="6701691" y="4554033"/>
+            <a:ext cx="2184302" cy="425822"/>
+          </a:xfrm>
+          <a:prstGeom prst="rect">
+            <a:avLst/>
+          </a:prstGeom>
+          <a:noFill/>
+        </p:spPr>
+        <p:txBody>
+          <a:bodyPr wrap="square">
+            <a:spAutoFit/>
+          </a:bodyPr>
+          <a:lstStyle/>
+          <a:p>
+            <a:r>
+              <a:rPr lang="en-GB" sz="2167" dirty="0">
+                <a:solidFill>
+                  <a:srgbClr val="004851"/>
+                </a:solidFill>
+                <a:latin typeface="Arial Nova Light" panose="020B0304020202020204" pitchFamily="34" charset="0"/>
+                <a:cs typeface="Arial" panose="020B0604020202020204" pitchFamily="34" charset="0"/>
+              </a:rPr>
+              <a:t>base</a:t>
+            </a:r>
+          </a:p>
+        </p:txBody>
+      </p:sp>
+      <p:cxnSp>
+        <p:nvCxnSpPr>
+          <p:cNvPr id="32" name="Conector recto 31">
+            <a:extLst>
+              <a:ext uri="{FF2B5EF4-FFF2-40B4-BE49-F238E27FC236}">
+                <a16:creationId xmlns:a16="http://schemas.microsoft.com/office/drawing/2014/main" id="{705BD86C-712B-98A6-858E-813F708EDBCE}"/>
+              </a:ext>
+            </a:extLst>
+          </p:cNvPr>
+          <p:cNvCxnSpPr>
+            <a:cxnSpLocks/>
+          </p:cNvCxnSpPr>
+          <p:nvPr/>
+        </p:nvCxnSpPr>
+        <p:spPr>
+          <a:xfrm>
+            <a:off x="5921942" y="4255391"/>
+            <a:ext cx="779749" cy="511553"/>
+          </a:xfrm>
+          <a:prstGeom prst="line">
+            <a:avLst/>
+          </a:prstGeom>
+        </p:spPr>
+        <p:style>
+          <a:lnRef idx="2">
+            <a:schemeClr val="accent1"/>
+          </a:lnRef>
+          <a:fillRef idx="0">
+            <a:schemeClr val="accent1"/>
+          </a:fillRef>
+          <a:effectRef idx="1">
+            <a:schemeClr val="accent1"/>
+          </a:effectRef>
+          <a:fontRef idx="minor">
+            <a:schemeClr val="tx1"/>
+          </a:fontRef>
+        </p:style>
+      </p:cxnSp>
+      <p:sp>
+        <p:nvSpPr>
+          <p:cNvPr id="35" name="CuadroTexto 34">
+            <a:extLst>
+              <a:ext uri="{FF2B5EF4-FFF2-40B4-BE49-F238E27FC236}">
+                <a16:creationId xmlns:a16="http://schemas.microsoft.com/office/drawing/2014/main" id="{F1969E66-77C5-45E2-C07C-532034D48B62}"/>
+              </a:ext>
+            </a:extLst>
+          </p:cNvPr>
+          <p:cNvSpPr txBox="1"/>
+          <p:nvPr/>
+        </p:nvSpPr>
+        <p:spPr>
+          <a:xfrm>
+            <a:off x="8119241" y="2646187"/>
+            <a:ext cx="2184302" cy="425822"/>
+          </a:xfrm>
+          <a:prstGeom prst="rect">
+            <a:avLst/>
+          </a:prstGeom>
+          <a:noFill/>
+        </p:spPr>
+        <p:txBody>
+          <a:bodyPr wrap="square">
+            <a:spAutoFit/>
+          </a:bodyPr>
+          <a:lstStyle/>
+          <a:p>
+            <a:r>
+              <a:rPr lang="en-GB" sz="2167" dirty="0">
+                <a:solidFill>
+                  <a:srgbClr val="004851"/>
+                </a:solidFill>
+                <a:latin typeface="Arial Nova Light" panose="020B0304020202020204" pitchFamily="34" charset="0"/>
+                <a:cs typeface="Arial" panose="020B0604020202020204" pitchFamily="34" charset="0"/>
+              </a:rPr>
+              <a:t>cover</a:t>
+            </a:r>
+          </a:p>
+        </p:txBody>
+      </p:sp>
+      <p:cxnSp>
+        <p:nvCxnSpPr>
+          <p:cNvPr id="36" name="Conector recto 35">
+            <a:extLst>
+              <a:ext uri="{FF2B5EF4-FFF2-40B4-BE49-F238E27FC236}">
+                <a16:creationId xmlns:a16="http://schemas.microsoft.com/office/drawing/2014/main" id="{D09F0C2B-3256-C031-D517-9CCEECDD358F}"/>
+              </a:ext>
+            </a:extLst>
+          </p:cNvPr>
+          <p:cNvCxnSpPr>
+            <a:cxnSpLocks/>
+          </p:cNvCxnSpPr>
+          <p:nvPr/>
+        </p:nvCxnSpPr>
+        <p:spPr>
+          <a:xfrm>
+            <a:off x="7343344" y="2539632"/>
+            <a:ext cx="761804" cy="340290"/>
+          </a:xfrm>
+          <a:prstGeom prst="line">
+            <a:avLst/>
+          </a:prstGeom>
+        </p:spPr>
+        <p:style>
+          <a:lnRef idx="2">
+            <a:schemeClr val="accent1"/>
+          </a:lnRef>
+          <a:fillRef idx="0">
+            <a:schemeClr val="accent1"/>
+          </a:fillRef>
+          <a:effectRef idx="1">
+            <a:schemeClr val="accent1"/>
+          </a:effectRef>
+          <a:fontRef idx="minor">
+            <a:schemeClr val="tx1"/>
+          </a:fontRef>
+        </p:style>
+      </p:cxnSp>
+      <p:sp>
+        <p:nvSpPr>
+          <p:cNvPr id="38" name="CuadroTexto 37">
+            <a:extLst>
+              <a:ext uri="{FF2B5EF4-FFF2-40B4-BE49-F238E27FC236}">
+                <a16:creationId xmlns:a16="http://schemas.microsoft.com/office/drawing/2014/main" id="{7040FD22-E684-57A8-40D8-450FC775E697}"/>
+              </a:ext>
+            </a:extLst>
+          </p:cNvPr>
+          <p:cNvSpPr txBox="1"/>
+          <p:nvPr/>
+        </p:nvSpPr>
+        <p:spPr>
+          <a:xfrm>
+            <a:off x="212377" y="6123689"/>
+            <a:ext cx="6876486" cy="307777"/>
+          </a:xfrm>
+          <a:prstGeom prst="rect">
+            <a:avLst/>
+          </a:prstGeom>
+          <a:noFill/>
+        </p:spPr>
+        <p:txBody>
+          <a:bodyPr wrap="square">
+            <a:spAutoFit/>
+          </a:bodyPr>
+          <a:lstStyle/>
+          <a:p>
+            <a:r>
+              <a:rPr lang="es-ES" sz="700" dirty="0">
+                <a:solidFill>
+                  <a:srgbClr val="004851"/>
+                </a:solidFill>
+                <a:latin typeface="Arial Nova Light" panose="020B0304020202020204" pitchFamily="34" charset="0"/>
+              </a:rPr>
+              <a:t>Vista explotada de la bombilla led</a:t>
+            </a:r>
+          </a:p>
+          <a:p>
+            <a:r>
+              <a:rPr lang="es-ES" sz="700" dirty="0" err="1">
+                <a:solidFill>
+                  <a:srgbClr val="004851"/>
+                </a:solidFill>
+                <a:latin typeface="Arial Nova Light" panose="020B0304020202020204" pitchFamily="34" charset="0"/>
+              </a:rPr>
+              <a:t>DepositPhotos</a:t>
+            </a:r>
+            <a:r>
+              <a:rPr lang="es-ES" sz="700" dirty="0">
+                <a:solidFill>
+                  <a:srgbClr val="004851"/>
+                </a:solidFill>
+                <a:latin typeface="Arial Nova Light" panose="020B0304020202020204" pitchFamily="34" charset="0"/>
+              </a:rPr>
+              <a:t>, 2016. ID:121401858</a:t>
+            </a:r>
+            <a:endParaRPr lang="en-GB" sz="700" dirty="0">
+              <a:solidFill>
+                <a:srgbClr val="004851"/>
+              </a:solidFill>
+              <a:latin typeface="Arial Nova Light" panose="020B0304020202020204" pitchFamily="34" charset="0"/>
             </a:endParaRPr>
           </a:p>
         </p:txBody>
@@ -5219,12 +5592,69 @@
           </a:p>
         </p:txBody>
       </p:sp>
+      <p:sp>
+        <p:nvSpPr>
+          <p:cNvPr id="9" name="Rectángulo 8">
+            <a:extLst>
+              <a:ext uri="{FF2B5EF4-FFF2-40B4-BE49-F238E27FC236}">
+                <a16:creationId xmlns:a16="http://schemas.microsoft.com/office/drawing/2014/main" id="{760CE149-D18A-98CA-257F-7D88CF280D66}"/>
+              </a:ext>
+            </a:extLst>
+          </p:cNvPr>
+          <p:cNvSpPr/>
+          <p:nvPr/>
+        </p:nvSpPr>
+        <p:spPr>
+          <a:xfrm>
+            <a:off x="682313" y="1133711"/>
+            <a:ext cx="7994841" cy="496290"/>
+          </a:xfrm>
+          <a:prstGeom prst="rect">
+            <a:avLst/>
+          </a:prstGeom>
+        </p:spPr>
+        <p:txBody>
+          <a:bodyPr wrap="square" lIns="99060" tIns="49530" rIns="99060" bIns="49530" anchor="t">
+            <a:spAutoFit/>
+          </a:bodyPr>
+          <a:lstStyle/>
+          <a:p>
+            <a:pPr>
+              <a:lnSpc>
+                <a:spcPct val="130000"/>
+              </a:lnSpc>
+              <a:spcBef>
+                <a:spcPts val="542"/>
+              </a:spcBef>
+              <a:buClr>
+                <a:srgbClr val="00A3AE"/>
+              </a:buClr>
+              <a:buSzPts val="2000"/>
+            </a:pPr>
+            <a:r>
+              <a:rPr lang="en-US" sz="2167" dirty="0">
+                <a:solidFill>
+                  <a:srgbClr val="004851"/>
+                </a:solidFill>
+                <a:latin typeface="Arial Nova Light" panose="020B0304020202020204" pitchFamily="34" charset="0"/>
+                <a:cs typeface="Arial" panose="020B0604020202020204" pitchFamily="34" charset="0"/>
+              </a:rPr>
+              <a:t>Example: light bulb</a:t>
+            </a:r>
+            <a:endParaRPr lang="es-ES" sz="1517" dirty="0">
+              <a:solidFill>
+                <a:srgbClr val="004851"/>
+              </a:solidFill>
+            </a:endParaRPr>
+          </a:p>
+        </p:txBody>
+      </p:sp>
       <p:pic>
         <p:nvPicPr>
-          <p:cNvPr id="7" name="Imagen 6">
-            <a:extLst>
-              <a:ext uri="{FF2B5EF4-FFF2-40B4-BE49-F238E27FC236}">
-                <a16:creationId xmlns:a16="http://schemas.microsoft.com/office/drawing/2014/main" id="{172912FC-822B-07BC-7453-CDB64D815BA5}"/>
+          <p:cNvPr id="10" name="Imagen 9">
+            <a:extLst>
+              <a:ext uri="{FF2B5EF4-FFF2-40B4-BE49-F238E27FC236}">
+                <a16:creationId xmlns:a16="http://schemas.microsoft.com/office/drawing/2014/main" id="{D151FF91-46B0-8A97-E024-1529A8EEB239}"/>
               </a:ext>
             </a:extLst>
           </p:cNvPr>
@@ -5241,67 +5671,20 @@
         </p:blipFill>
         <p:spPr>
           <a:xfrm>
-            <a:off x="1350971" y="4559950"/>
-            <a:ext cx="6739106" cy="1511644"/>
+            <a:off x="695902" y="1665797"/>
+            <a:ext cx="4225208" cy="3168906"/>
           </a:xfrm>
           <a:prstGeom prst="rect">
             <a:avLst/>
           </a:prstGeom>
         </p:spPr>
       </p:pic>
-      <p:pic>
-        <p:nvPicPr>
-          <p:cNvPr id="8" name="Picture 2" descr="Common Washing Machine Problems And Cures">
-            <a:extLst>
-              <a:ext uri="{FF2B5EF4-FFF2-40B4-BE49-F238E27FC236}">
-                <a16:creationId xmlns:a16="http://schemas.microsoft.com/office/drawing/2014/main" id="{58A0D5A7-115D-6353-90BE-2291827E4B26}"/>
-              </a:ext>
-            </a:extLst>
-          </p:cNvPr>
-          <p:cNvPicPr>
-            <a:picLocks noChangeAspect="1" noChangeArrowheads="1"/>
-          </p:cNvPicPr>
-          <p:nvPr/>
-        </p:nvPicPr>
-        <p:blipFill>
-          <a:blip r:embed="rId3">
-            <a:extLst>
-              <a:ext uri="{28A0092B-C50C-407E-A947-70E740481C1C}">
-                <a14:useLocalDpi xmlns:a14="http://schemas.microsoft.com/office/drawing/2010/main"/>
-              </a:ext>
-            </a:extLst>
-          </a:blip>
-          <a:srcRect/>
-          <a:stretch>
-            <a:fillRect/>
-          </a:stretch>
-        </p:blipFill>
-        <p:spPr bwMode="auto">
-          <a:xfrm>
-            <a:off x="1067491" y="1765937"/>
-            <a:ext cx="2568190" cy="2794013"/>
-          </a:xfrm>
-          <a:prstGeom prst="rect">
-            <a:avLst/>
-          </a:prstGeom>
-          <a:noFill/>
-          <a:extLst>
-            <a:ext uri="{909E8E84-426E-40DD-AFC4-6F175D3DCCD1}">
-              <a14:hiddenFill xmlns:a14="http://schemas.microsoft.com/office/drawing/2010/main">
-                <a:solidFill>
-                  <a:srgbClr val="FFFFFF"/>
-                </a:solidFill>
-              </a14:hiddenFill>
-            </a:ext>
-          </a:extLst>
-        </p:spPr>
-      </p:pic>
-      <p:sp>
-        <p:nvSpPr>
-          <p:cNvPr id="6" name="CuadroTexto 5">
-            <a:extLst>
-              <a:ext uri="{FF2B5EF4-FFF2-40B4-BE49-F238E27FC236}">
-                <a16:creationId xmlns:a16="http://schemas.microsoft.com/office/drawing/2014/main" id="{D3B19DDF-6C8E-7AD4-D6D0-3071FC92C50A}"/>
+      <p:sp>
+        <p:nvSpPr>
+          <p:cNvPr id="50" name="CuadroTexto 49">
+            <a:extLst>
+              <a:ext uri="{FF2B5EF4-FFF2-40B4-BE49-F238E27FC236}">
+                <a16:creationId xmlns:a16="http://schemas.microsoft.com/office/drawing/2014/main" id="{95E06BFA-2083-AF11-5499-01854BB05793}"/>
               </a:ext>
             </a:extLst>
           </p:cNvPr>
@@ -5310,8 +5693,8 @@
         </p:nvSpPr>
         <p:spPr>
           <a:xfrm>
-            <a:off x="457201" y="4564020"/>
-            <a:ext cx="4043538" cy="225767"/>
+            <a:off x="212377" y="6123689"/>
+            <a:ext cx="6876486" cy="307777"/>
           </a:xfrm>
           <a:prstGeom prst="rect">
             <a:avLst/>
@@ -5322,193 +5705,76 @@
           <a:bodyPr wrap="square">
             <a:spAutoFit/>
           </a:bodyPr>
-          <a:lstStyle>
-            <a:defPPr>
-              <a:defRPr lang="en-US"/>
-            </a:defPPr>
-            <a:lvl1pPr>
-              <a:defRPr sz="1050" i="1">
-                <a:solidFill>
-                  <a:schemeClr val="accent2"/>
+          <a:lstStyle/>
+          <a:p>
+            <a:r>
+              <a:rPr lang="es-ES" sz="700" dirty="0">
+                <a:solidFill>
+                  <a:srgbClr val="004851"/>
                 </a:solidFill>
                 <a:latin typeface="Arial Nova Light" panose="020B0304020202020204" pitchFamily="34" charset="0"/>
-                <a:cs typeface="Arial" panose="020B0604020202020204" pitchFamily="34" charset="0"/>
-              </a:defRPr>
-            </a:lvl1pPr>
-            <a:lvl2pPr>
-              <a:buSzPts val="1400"/>
-              <a:buNone/>
-              <a:defRPr sz="1800">
-                <a:solidFill>
-                  <a:schemeClr val="dk1"/>
-                </a:solidFill>
-                <a:latin typeface="Calibri"/>
-                <a:ea typeface="Calibri"/>
-                <a:cs typeface="Calibri"/>
-                <a:sym typeface="Calibri"/>
-              </a:defRPr>
-            </a:lvl2pPr>
-            <a:lvl3pPr>
-              <a:buSzPts val="1400"/>
-              <a:buNone/>
-              <a:defRPr sz="1800">
-                <a:solidFill>
-                  <a:schemeClr val="dk1"/>
-                </a:solidFill>
-                <a:latin typeface="Calibri"/>
-                <a:ea typeface="Calibri"/>
-                <a:cs typeface="Calibri"/>
-                <a:sym typeface="Calibri"/>
-              </a:defRPr>
-            </a:lvl3pPr>
-            <a:lvl4pPr>
-              <a:buSzPts val="1400"/>
-              <a:buNone/>
-              <a:defRPr sz="1800">
-                <a:solidFill>
-                  <a:schemeClr val="dk1"/>
-                </a:solidFill>
-                <a:latin typeface="Calibri"/>
-                <a:ea typeface="Calibri"/>
-                <a:cs typeface="Calibri"/>
-                <a:sym typeface="Calibri"/>
-              </a:defRPr>
-            </a:lvl4pPr>
-            <a:lvl5pPr>
-              <a:buSzPts val="1400"/>
-              <a:buNone/>
-              <a:defRPr sz="1800">
-                <a:solidFill>
-                  <a:schemeClr val="dk1"/>
-                </a:solidFill>
-                <a:latin typeface="Calibri"/>
-                <a:ea typeface="Calibri"/>
-                <a:cs typeface="Calibri"/>
-                <a:sym typeface="Calibri"/>
-              </a:defRPr>
-            </a:lvl5pPr>
-            <a:lvl6pPr>
-              <a:buSzPts val="1400"/>
-              <a:buNone/>
-              <a:defRPr sz="1800">
-                <a:solidFill>
-                  <a:schemeClr val="dk1"/>
-                </a:solidFill>
-                <a:latin typeface="Calibri"/>
-                <a:ea typeface="Calibri"/>
-                <a:cs typeface="Calibri"/>
-                <a:sym typeface="Calibri"/>
-              </a:defRPr>
-            </a:lvl6pPr>
-            <a:lvl7pPr>
-              <a:buSzPts val="1400"/>
-              <a:buNone/>
-              <a:defRPr sz="1800">
-                <a:solidFill>
-                  <a:schemeClr val="dk1"/>
-                </a:solidFill>
-                <a:latin typeface="Calibri"/>
-                <a:ea typeface="Calibri"/>
-                <a:cs typeface="Calibri"/>
-                <a:sym typeface="Calibri"/>
-              </a:defRPr>
-            </a:lvl7pPr>
-            <a:lvl8pPr>
-              <a:buSzPts val="1400"/>
-              <a:buNone/>
-              <a:defRPr sz="1800">
-                <a:solidFill>
-                  <a:schemeClr val="dk1"/>
-                </a:solidFill>
-                <a:latin typeface="Calibri"/>
-                <a:ea typeface="Calibri"/>
-                <a:cs typeface="Calibri"/>
-                <a:sym typeface="Calibri"/>
-              </a:defRPr>
-            </a:lvl8pPr>
-            <a:lvl9pPr>
-              <a:buSzPts val="1400"/>
-              <a:buNone/>
-              <a:defRPr sz="1800">
-                <a:solidFill>
-                  <a:schemeClr val="dk1"/>
-                </a:solidFill>
-                <a:latin typeface="Calibri"/>
-                <a:ea typeface="Calibri"/>
-                <a:cs typeface="Calibri"/>
-                <a:sym typeface="Calibri"/>
-              </a:defRPr>
-            </a:lvl9pPr>
-          </a:lstStyle>
-          <a:p>
-            <a:r>
-              <a:rPr lang="es-ES" sz="867" dirty="0" err="1"/>
-              <a:t>Source</a:t>
-            </a:r>
-            <a:r>
-              <a:rPr lang="es-ES" sz="867" dirty="0"/>
-              <a:t>: www.ukwhitegoods.co.uk/2967-washing-machine-a-washer-dryer-top-</a:t>
-            </a:r>
-          </a:p>
-        </p:txBody>
-      </p:sp>
-      <p:sp>
-        <p:nvSpPr>
-          <p:cNvPr id="9" name="Rectángulo 8">
-            <a:extLst>
-              <a:ext uri="{FF2B5EF4-FFF2-40B4-BE49-F238E27FC236}">
-                <a16:creationId xmlns:a16="http://schemas.microsoft.com/office/drawing/2014/main" id="{760CE149-D18A-98CA-257F-7D88CF280D66}"/>
-              </a:ext>
-            </a:extLst>
-          </p:cNvPr>
-          <p:cNvSpPr/>
+              </a:rPr>
+              <a:t>Vista explotada de la bombilla led</a:t>
+            </a:r>
+          </a:p>
+          <a:p>
+            <a:r>
+              <a:rPr lang="es-ES" sz="700" dirty="0" err="1">
+                <a:solidFill>
+                  <a:srgbClr val="004851"/>
+                </a:solidFill>
+                <a:latin typeface="Arial Nova Light" panose="020B0304020202020204" pitchFamily="34" charset="0"/>
+              </a:rPr>
+              <a:t>DepositPhotos</a:t>
+            </a:r>
+            <a:r>
+              <a:rPr lang="es-ES" sz="700" dirty="0">
+                <a:solidFill>
+                  <a:srgbClr val="004851"/>
+                </a:solidFill>
+                <a:latin typeface="Arial Nova Light" panose="020B0304020202020204" pitchFamily="34" charset="0"/>
+              </a:rPr>
+              <a:t>, 2016. ID:121401858</a:t>
+            </a:r>
+            <a:endParaRPr lang="en-GB" sz="700" dirty="0">
+              <a:solidFill>
+                <a:srgbClr val="004851"/>
+              </a:solidFill>
+              <a:latin typeface="Arial Nova Light" panose="020B0304020202020204" pitchFamily="34" charset="0"/>
+            </a:endParaRPr>
+          </a:p>
+        </p:txBody>
+      </p:sp>
+      <p:pic>
+        <p:nvPicPr>
+          <p:cNvPr id="52" name="Imagen 51">
+            <a:extLst>
+              <a:ext uri="{FF2B5EF4-FFF2-40B4-BE49-F238E27FC236}">
+                <a16:creationId xmlns:a16="http://schemas.microsoft.com/office/drawing/2014/main" id="{FEF7797B-1218-C101-27B7-ADC45DEBB7AB}"/>
+              </a:ext>
+            </a:extLst>
+          </p:cNvPr>
+          <p:cNvPicPr>
+            <a:picLocks noChangeAspect="1"/>
+          </p:cNvPicPr>
           <p:nvPr/>
-        </p:nvSpPr>
+        </p:nvPicPr>
+        <p:blipFill>
+          <a:blip r:embed="rId3"/>
+          <a:stretch>
+            <a:fillRect/>
+          </a:stretch>
+        </p:blipFill>
         <p:spPr>
           <a:xfrm>
-            <a:off x="682313" y="1133711"/>
-            <a:ext cx="7994841" cy="496290"/>
+            <a:off x="1352549" y="4255647"/>
+            <a:ext cx="7667625" cy="1503651"/>
           </a:xfrm>
           <a:prstGeom prst="rect">
             <a:avLst/>
           </a:prstGeom>
         </p:spPr>
-        <p:txBody>
-          <a:bodyPr wrap="square" lIns="99060" tIns="49530" rIns="99060" bIns="49530" anchor="t">
-            <a:spAutoFit/>
-          </a:bodyPr>
-          <a:lstStyle/>
-          <a:p>
-            <a:pPr>
-              <a:lnSpc>
-                <a:spcPct val="130000"/>
-              </a:lnSpc>
-              <a:spcBef>
-                <a:spcPts val="542"/>
-              </a:spcBef>
-              <a:buClr>
-                <a:srgbClr val="00A3AE"/>
-              </a:buClr>
-              <a:buSzPts val="2000"/>
-            </a:pPr>
-            <a:r>
-              <a:rPr lang="en-US" sz="2167" dirty="0">
-                <a:solidFill>
-                  <a:srgbClr val="004851"/>
-                </a:solidFill>
-                <a:latin typeface="Arial Nova Light" panose="020B0304020202020204" pitchFamily="34" charset="0"/>
-                <a:cs typeface="Arial" panose="020B0604020202020204" pitchFamily="34" charset="0"/>
-              </a:rPr>
-              <a:t>Example: washing machine</a:t>
-            </a:r>
-            <a:endParaRPr lang="es-ES" sz="1517" dirty="0">
-              <a:solidFill>
-                <a:srgbClr val="004851"/>
-              </a:solidFill>
-            </a:endParaRPr>
-          </a:p>
-        </p:txBody>
-      </p:sp>
+      </p:pic>
     </p:spTree>
     <p:extLst>
       <p:ext uri="{BB962C8B-B14F-4D97-AF65-F5344CB8AC3E}">
@@ -5544,7 +5810,7 @@
           <p:cNvPr id="2" name="Marcador de fecha 1">
             <a:extLst>
               <a:ext uri="{FF2B5EF4-FFF2-40B4-BE49-F238E27FC236}">
-                <a16:creationId xmlns:a16="http://schemas.microsoft.com/office/drawing/2014/main" id="{D7DD6011-E120-7A3D-5B06-721DE9A1933F}"/>
+                <a16:creationId xmlns:a16="http://schemas.microsoft.com/office/drawing/2014/main" id="{C317228A-0183-9B76-263B-FCEB5CAA2433}"/>
               </a:ext>
             </a:extLst>
           </p:cNvPr>
@@ -5573,7 +5839,7 @@
           <p:cNvPr id="3" name="Marcador de pie de página 2">
             <a:extLst>
               <a:ext uri="{FF2B5EF4-FFF2-40B4-BE49-F238E27FC236}">
-                <a16:creationId xmlns:a16="http://schemas.microsoft.com/office/drawing/2014/main" id="{0635EC9D-220B-41C9-5E24-067D425C354C}"/>
+                <a16:creationId xmlns:a16="http://schemas.microsoft.com/office/drawing/2014/main" id="{D261DD60-1E3E-07A8-3364-D22012500BF1}"/>
               </a:ext>
             </a:extLst>
           </p:cNvPr>
@@ -5602,7 +5868,7 @@
           <p:cNvPr id="4" name="Marcador de número de diapositiva 3">
             <a:extLst>
               <a:ext uri="{FF2B5EF4-FFF2-40B4-BE49-F238E27FC236}">
-                <a16:creationId xmlns:a16="http://schemas.microsoft.com/office/drawing/2014/main" id="{5EE97484-D537-927C-559F-7109190FCD9E}"/>
+                <a16:creationId xmlns:a16="http://schemas.microsoft.com/office/drawing/2014/main" id="{BBC66C7F-D340-823B-AAD4-6735F54B9FAA}"/>
               </a:ext>
             </a:extLst>
           </p:cNvPr>
@@ -5632,7 +5898,7 @@
           <p:cNvPr id="5" name="Título 4">
             <a:extLst>
               <a:ext uri="{FF2B5EF4-FFF2-40B4-BE49-F238E27FC236}">
-                <a16:creationId xmlns:a16="http://schemas.microsoft.com/office/drawing/2014/main" id="{A0149695-7BBC-525D-6494-1CD7AAD35A8D}"/>
+                <a16:creationId xmlns:a16="http://schemas.microsoft.com/office/drawing/2014/main" id="{58E7A739-7B37-E8CF-C038-F6B09B115485}"/>
               </a:ext>
             </a:extLst>
           </p:cNvPr>
@@ -5649,18 +5915,27 @@
           <a:lstStyle/>
           <a:p>
             <a:r>
-              <a:rPr lang="es-ES"/>
-              <a:t>Functional Decomposition</a:t>
-            </a:r>
-          </a:p>
-        </p:txBody>
-      </p:sp>
-      <p:sp>
-        <p:nvSpPr>
-          <p:cNvPr id="6" name="Rectángulo 5">
-            <a:extLst>
-              <a:ext uri="{FF2B5EF4-FFF2-40B4-BE49-F238E27FC236}">
-                <a16:creationId xmlns:a16="http://schemas.microsoft.com/office/drawing/2014/main" id="{6729B47C-67DD-DEA9-161B-92D5D55BB43B}"/>
+              <a:rPr lang="es-ES" dirty="0" err="1"/>
+              <a:t>Structural</a:t>
+            </a:r>
+            <a:r>
+              <a:rPr lang="es-ES" dirty="0"/>
+              <a:t> </a:t>
+            </a:r>
+            <a:r>
+              <a:rPr lang="es-ES" dirty="0" err="1"/>
+              <a:t>Decomposition</a:t>
+            </a:r>
+            <a:endParaRPr lang="es-ES" dirty="0"/>
+          </a:p>
+        </p:txBody>
+      </p:sp>
+      <p:sp>
+        <p:nvSpPr>
+          <p:cNvPr id="9" name="Rectángulo 8">
+            <a:extLst>
+              <a:ext uri="{FF2B5EF4-FFF2-40B4-BE49-F238E27FC236}">
+                <a16:creationId xmlns:a16="http://schemas.microsoft.com/office/drawing/2014/main" id="{760CE149-D18A-98CA-257F-7D88CF280D66}"/>
               </a:ext>
             </a:extLst>
           </p:cNvPr>
@@ -5669,7 +5944,7 @@
         </p:nvSpPr>
         <p:spPr>
           <a:xfrm>
-            <a:off x="682313" y="1381856"/>
+            <a:off x="682313" y="1133711"/>
             <a:ext cx="7994841" cy="496290"/>
           </a:xfrm>
           <a:prstGeom prst="rect">
@@ -5702,7 +5977,7 @@
                 <a:latin typeface="Arial Nova Light" panose="020B0304020202020204" pitchFamily="34" charset="0"/>
                 <a:cs typeface="Arial" panose="020B0604020202020204" pitchFamily="34" charset="0"/>
               </a:rPr>
-              <a:t>Example: UAV function, Flight</a:t>
+              <a:t>Example: light bulb</a:t>
             </a:r>
             <a:endParaRPr lang="es-ES" sz="1517" dirty="0">
               <a:solidFill>
@@ -5714,10 +5989,97 @@
       </p:sp>
       <p:pic>
         <p:nvPicPr>
-          <p:cNvPr id="7" name="Imagen 6" descr="Un avion en al aire&#10;&#10;Descripción generada automáticamente con confianza baja">
-            <a:extLst>
-              <a:ext uri="{FF2B5EF4-FFF2-40B4-BE49-F238E27FC236}">
-                <a16:creationId xmlns:a16="http://schemas.microsoft.com/office/drawing/2014/main" id="{B3219ED0-F3E7-AFAA-D56E-06C526F5F932}"/>
+          <p:cNvPr id="10" name="Imagen 9">
+            <a:extLst>
+              <a:ext uri="{FF2B5EF4-FFF2-40B4-BE49-F238E27FC236}">
+                <a16:creationId xmlns:a16="http://schemas.microsoft.com/office/drawing/2014/main" id="{D151FF91-46B0-8A97-E024-1529A8EEB239}"/>
+              </a:ext>
+            </a:extLst>
+          </p:cNvPr>
+          <p:cNvPicPr>
+            <a:picLocks noChangeAspect="1"/>
+          </p:cNvPicPr>
+          <p:nvPr/>
+        </p:nvPicPr>
+        <p:blipFill>
+          <a:blip r:embed="rId2"/>
+          <a:stretch>
+            <a:fillRect/>
+          </a:stretch>
+        </p:blipFill>
+        <p:spPr>
+          <a:xfrm>
+            <a:off x="695902" y="1665797"/>
+            <a:ext cx="4225208" cy="3168906"/>
+          </a:xfrm>
+          <a:prstGeom prst="rect">
+            <a:avLst/>
+          </a:prstGeom>
+        </p:spPr>
+      </p:pic>
+      <p:sp>
+        <p:nvSpPr>
+          <p:cNvPr id="6" name="Rectángulo 5">
+            <a:extLst>
+              <a:ext uri="{FF2B5EF4-FFF2-40B4-BE49-F238E27FC236}">
+                <a16:creationId xmlns:a16="http://schemas.microsoft.com/office/drawing/2014/main" id="{F89701FA-DB99-A6E6-D81D-0C2EF2178B30}"/>
+              </a:ext>
+            </a:extLst>
+          </p:cNvPr>
+          <p:cNvSpPr/>
+          <p:nvPr/>
+        </p:nvSpPr>
+        <p:spPr>
+          <a:xfrm>
+            <a:off x="2914998" y="3940820"/>
+            <a:ext cx="3529469" cy="1363322"/>
+          </a:xfrm>
+          <a:prstGeom prst="rect">
+            <a:avLst/>
+          </a:prstGeom>
+        </p:spPr>
+        <p:txBody>
+          <a:bodyPr wrap="square" lIns="99060" tIns="49530" rIns="99060" bIns="49530" anchor="t">
+            <a:spAutoFit/>
+          </a:bodyPr>
+          <a:lstStyle/>
+          <a:p>
+            <a:pPr>
+              <a:lnSpc>
+                <a:spcPct val="130000"/>
+              </a:lnSpc>
+              <a:spcBef>
+                <a:spcPts val="542"/>
+              </a:spcBef>
+              <a:buClr>
+                <a:srgbClr val="00A3AE"/>
+              </a:buClr>
+              <a:buSzPts val="2000"/>
+            </a:pPr>
+            <a:r>
+              <a:rPr lang="en-US" sz="2167" dirty="0">
+                <a:solidFill>
+                  <a:srgbClr val="004851"/>
+                </a:solidFill>
+                <a:latin typeface="Arial Nova Light" panose="020B0304020202020204" pitchFamily="34" charset="0"/>
+                <a:cs typeface="Arial" panose="020B0604020202020204" pitchFamily="34" charset="0"/>
+              </a:rPr>
+              <a:t>Each subsystem is decomposed and organized in hierarchies</a:t>
+            </a:r>
+            <a:endParaRPr lang="es-ES" sz="1517" dirty="0">
+              <a:solidFill>
+                <a:srgbClr val="004851"/>
+              </a:solidFill>
+            </a:endParaRPr>
+          </a:p>
+        </p:txBody>
+      </p:sp>
+      <p:pic>
+        <p:nvPicPr>
+          <p:cNvPr id="8" name="Imagen 7">
+            <a:extLst>
+              <a:ext uri="{FF2B5EF4-FFF2-40B4-BE49-F238E27FC236}">
+                <a16:creationId xmlns:a16="http://schemas.microsoft.com/office/drawing/2014/main" id="{60F8C71E-E35B-36F3-E315-49EFA59B93CD}"/>
               </a:ext>
             </a:extLst>
           </p:cNvPr>
@@ -5727,60 +6089,131 @@
           <p:nvPr/>
         </p:nvPicPr>
         <p:blipFill rotWithShape="1">
-          <a:blip r:embed="rId2" cstate="hqprint">
-            <a:extLst>
-              <a:ext uri="{28A0092B-C50C-407E-A947-70E740481C1C}">
-                <a14:useLocalDpi xmlns:a14="http://schemas.microsoft.com/office/drawing/2010/main"/>
-              </a:ext>
-            </a:extLst>
-          </a:blip>
-          <a:srcRect/>
+          <a:blip r:embed="rId2"/>
+          <a:srcRect l="38986" t="38982" r="43205" b="33202"/>
           <a:stretch/>
         </p:blipFill>
         <p:spPr>
           <a:xfrm>
-            <a:off x="548429" y="2718017"/>
-            <a:ext cx="3606313" cy="2432613"/>
+            <a:off x="6858285" y="1812089"/>
+            <a:ext cx="2760526" cy="3233822"/>
           </a:xfrm>
           <a:prstGeom prst="rect">
             <a:avLst/>
           </a:prstGeom>
         </p:spPr>
       </p:pic>
-      <p:pic>
-        <p:nvPicPr>
-          <p:cNvPr id="8" name="Imagen 7">
-            <a:extLst>
-              <a:ext uri="{FF2B5EF4-FFF2-40B4-BE49-F238E27FC236}">
-                <a16:creationId xmlns:a16="http://schemas.microsoft.com/office/drawing/2014/main" id="{B66136C1-736B-C1C5-B7AB-6C2956BD5C71}"/>
-              </a:ext>
-            </a:extLst>
-          </p:cNvPr>
-          <p:cNvPicPr>
-            <a:picLocks noChangeAspect="1"/>
-          </p:cNvPicPr>
+      <p:sp>
+        <p:nvSpPr>
+          <p:cNvPr id="11" name="CuadroTexto 10">
+            <a:extLst>
+              <a:ext uri="{FF2B5EF4-FFF2-40B4-BE49-F238E27FC236}">
+                <a16:creationId xmlns:a16="http://schemas.microsoft.com/office/drawing/2014/main" id="{DEB70623-B63C-FE9D-5F85-7BA55AAA12EB}"/>
+              </a:ext>
+            </a:extLst>
+          </p:cNvPr>
+          <p:cNvSpPr txBox="1"/>
           <p:nvPr/>
-        </p:nvPicPr>
-        <p:blipFill>
-          <a:blip r:embed="rId3"/>
-          <a:stretch>
-            <a:fillRect/>
-          </a:stretch>
-        </p:blipFill>
+        </p:nvSpPr>
         <p:spPr>
           <a:xfrm>
-            <a:off x="5407374" y="3034898"/>
-            <a:ext cx="4359802" cy="1798848"/>
+            <a:off x="212377" y="6123689"/>
+            <a:ext cx="6876486" cy="307777"/>
           </a:xfrm>
           <a:prstGeom prst="rect">
             <a:avLst/>
           </a:prstGeom>
+          <a:noFill/>
         </p:spPr>
-      </p:pic>
+        <p:txBody>
+          <a:bodyPr wrap="square">
+            <a:spAutoFit/>
+          </a:bodyPr>
+          <a:lstStyle/>
+          <a:p>
+            <a:r>
+              <a:rPr lang="es-ES" sz="700" dirty="0">
+                <a:solidFill>
+                  <a:srgbClr val="004851"/>
+                </a:solidFill>
+                <a:latin typeface="Arial Nova Light" panose="020B0304020202020204" pitchFamily="34" charset="0"/>
+              </a:rPr>
+              <a:t>Vista explotada de la bombilla led</a:t>
+            </a:r>
+          </a:p>
+          <a:p>
+            <a:r>
+              <a:rPr lang="es-ES" sz="700" dirty="0" err="1">
+                <a:solidFill>
+                  <a:srgbClr val="004851"/>
+                </a:solidFill>
+                <a:latin typeface="Arial Nova Light" panose="020B0304020202020204" pitchFamily="34" charset="0"/>
+              </a:rPr>
+              <a:t>DepositPhotos</a:t>
+            </a:r>
+            <a:r>
+              <a:rPr lang="es-ES" sz="700" dirty="0">
+                <a:solidFill>
+                  <a:srgbClr val="004851"/>
+                </a:solidFill>
+                <a:latin typeface="Arial Nova Light" panose="020B0304020202020204" pitchFamily="34" charset="0"/>
+              </a:rPr>
+              <a:t>, 2016. ID:121401858</a:t>
+            </a:r>
+            <a:endParaRPr lang="en-GB" sz="700" dirty="0">
+              <a:solidFill>
+                <a:srgbClr val="004851"/>
+              </a:solidFill>
+              <a:latin typeface="Arial Nova Light" panose="020B0304020202020204" pitchFamily="34" charset="0"/>
+            </a:endParaRPr>
+          </a:p>
+        </p:txBody>
+      </p:sp>
+      <p:cxnSp>
+        <p:nvCxnSpPr>
+          <p:cNvPr id="13" name="Conector recto de flecha 12">
+            <a:extLst>
+              <a:ext uri="{FF2B5EF4-FFF2-40B4-BE49-F238E27FC236}">
+                <a16:creationId xmlns:a16="http://schemas.microsoft.com/office/drawing/2014/main" id="{92C4D3B2-29B6-3FEB-401D-C488A3E9540E}"/>
+              </a:ext>
+            </a:extLst>
+          </p:cNvPr>
+          <p:cNvCxnSpPr>
+            <a:cxnSpLocks/>
+          </p:cNvCxnSpPr>
+          <p:nvPr/>
+        </p:nvCxnSpPr>
+        <p:spPr>
+          <a:xfrm>
+            <a:off x="2895600" y="3581400"/>
+            <a:ext cx="4095750" cy="240768"/>
+          </a:xfrm>
+          <a:prstGeom prst="straightConnector1">
+            <a:avLst/>
+          </a:prstGeom>
+          <a:ln>
+            <a:tailEnd type="triangle"/>
+          </a:ln>
+        </p:spPr>
+        <p:style>
+          <a:lnRef idx="2">
+            <a:schemeClr val="accent6"/>
+          </a:lnRef>
+          <a:fillRef idx="0">
+            <a:schemeClr val="accent6"/>
+          </a:fillRef>
+          <a:effectRef idx="1">
+            <a:schemeClr val="accent6"/>
+          </a:effectRef>
+          <a:fontRef idx="minor">
+            <a:schemeClr val="tx1"/>
+          </a:fontRef>
+        </p:style>
+      </p:cxnSp>
     </p:spTree>
     <p:extLst>
       <p:ext uri="{BB962C8B-B14F-4D97-AF65-F5344CB8AC3E}">
-        <p14:creationId xmlns:p14="http://schemas.microsoft.com/office/powerpoint/2010/main" val="4130771978"/>
+        <p14:creationId xmlns:p14="http://schemas.microsoft.com/office/powerpoint/2010/main" val="3586065033"/>
       </p:ext>
     </p:extLst>
   </p:cSld>
@@ -5812,7 +6245,7 @@
           <p:cNvPr id="2" name="Marcador de fecha 1">
             <a:extLst>
               <a:ext uri="{FF2B5EF4-FFF2-40B4-BE49-F238E27FC236}">
-                <a16:creationId xmlns:a16="http://schemas.microsoft.com/office/drawing/2014/main" id="{2C8D63E8-D259-E69F-184D-44D4CD17D6AA}"/>
+                <a16:creationId xmlns:a16="http://schemas.microsoft.com/office/drawing/2014/main" id="{C317228A-0183-9B76-263B-FCEB5CAA2433}"/>
               </a:ext>
             </a:extLst>
           </p:cNvPr>
@@ -5841,7 +6274,7 @@
           <p:cNvPr id="3" name="Marcador de pie de página 2">
             <a:extLst>
               <a:ext uri="{FF2B5EF4-FFF2-40B4-BE49-F238E27FC236}">
-                <a16:creationId xmlns:a16="http://schemas.microsoft.com/office/drawing/2014/main" id="{046334FD-D8CB-83CE-B06B-B6FB2CA703F6}"/>
+                <a16:creationId xmlns:a16="http://schemas.microsoft.com/office/drawing/2014/main" id="{D261DD60-1E3E-07A8-3364-D22012500BF1}"/>
               </a:ext>
             </a:extLst>
           </p:cNvPr>
@@ -5870,7 +6303,7 @@
           <p:cNvPr id="4" name="Marcador de número de diapositiva 3">
             <a:extLst>
               <a:ext uri="{FF2B5EF4-FFF2-40B4-BE49-F238E27FC236}">
-                <a16:creationId xmlns:a16="http://schemas.microsoft.com/office/drawing/2014/main" id="{F09EA907-5B8E-39B7-3DAE-9267CEA28EDE}"/>
+                <a16:creationId xmlns:a16="http://schemas.microsoft.com/office/drawing/2014/main" id="{BBC66C7F-D340-823B-AAD4-6735F54B9FAA}"/>
               </a:ext>
             </a:extLst>
           </p:cNvPr>
@@ -5900,7 +6333,7 @@
           <p:cNvPr id="5" name="Título 4">
             <a:extLst>
               <a:ext uri="{FF2B5EF4-FFF2-40B4-BE49-F238E27FC236}">
-                <a16:creationId xmlns:a16="http://schemas.microsoft.com/office/drawing/2014/main" id="{67BDA27C-996E-C382-2AF1-095EC39FDEA6}"/>
+                <a16:creationId xmlns:a16="http://schemas.microsoft.com/office/drawing/2014/main" id="{58E7A739-7B37-E8CF-C038-F6B09B115485}"/>
               </a:ext>
             </a:extLst>
           </p:cNvPr>
@@ -5917,378 +6350,36 @@
           <a:lstStyle/>
           <a:p>
             <a:r>
-              <a:rPr lang="es-ES"/>
-              <a:t>Decomposition hierarchy</a:t>
-            </a:r>
-          </a:p>
-        </p:txBody>
-      </p:sp>
-      <p:pic>
-        <p:nvPicPr>
-          <p:cNvPr id="6" name="Picture 2" descr="Common Washing Machine Problems And Cures">
-            <a:extLst>
-              <a:ext uri="{FF2B5EF4-FFF2-40B4-BE49-F238E27FC236}">
-                <a16:creationId xmlns:a16="http://schemas.microsoft.com/office/drawing/2014/main" id="{23A0B7D1-2558-C8D8-0BC1-20DABD0935A6}"/>
-              </a:ext>
-            </a:extLst>
-          </p:cNvPr>
-          <p:cNvPicPr>
-            <a:picLocks noChangeAspect="1" noChangeArrowheads="1"/>
-          </p:cNvPicPr>
+              <a:rPr lang="es-ES" dirty="0" err="1"/>
+              <a:t>Decomposition</a:t>
+            </a:r>
+            <a:r>
+              <a:rPr lang="es-ES" dirty="0"/>
+              <a:t> </a:t>
+            </a:r>
+            <a:r>
+              <a:rPr lang="es-ES" dirty="0" err="1"/>
+              <a:t>hierarchy</a:t>
+            </a:r>
+            <a:endParaRPr lang="es-ES" dirty="0"/>
+          </a:p>
+        </p:txBody>
+      </p:sp>
+      <p:sp>
+        <p:nvSpPr>
+          <p:cNvPr id="10" name="Rectángulo 9">
+            <a:extLst>
+              <a:ext uri="{FF2B5EF4-FFF2-40B4-BE49-F238E27FC236}">
+                <a16:creationId xmlns:a16="http://schemas.microsoft.com/office/drawing/2014/main" id="{40592393-083B-5C7E-29F0-332B1655017B}"/>
+              </a:ext>
+            </a:extLst>
+          </p:cNvPr>
+          <p:cNvSpPr/>
           <p:nvPr/>
-        </p:nvPicPr>
-        <p:blipFill>
-          <a:blip r:embed="rId2">
-            <a:extLst>
-              <a:ext uri="{28A0092B-C50C-407E-A947-70E740481C1C}">
-                <a14:useLocalDpi xmlns:a14="http://schemas.microsoft.com/office/drawing/2010/main"/>
-              </a:ext>
-            </a:extLst>
-          </a:blip>
-          <a:srcRect/>
-          <a:stretch>
-            <a:fillRect/>
-          </a:stretch>
-        </p:blipFill>
-        <p:spPr bwMode="auto">
-          <a:xfrm>
-            <a:off x="754437" y="1510280"/>
-            <a:ext cx="2387493" cy="2597427"/>
-          </a:xfrm>
-          <a:prstGeom prst="rect">
-            <a:avLst/>
-          </a:prstGeom>
-          <a:noFill/>
-          <a:extLst>
-            <a:ext uri="{909E8E84-426E-40DD-AFC4-6F175D3DCCD1}">
-              <a14:hiddenFill xmlns:a14="http://schemas.microsoft.com/office/drawing/2010/main">
-                <a:solidFill>
-                  <a:srgbClr val="FFFFFF"/>
-                </a:solidFill>
-              </a14:hiddenFill>
-            </a:ext>
-          </a:extLst>
-        </p:spPr>
-      </p:pic>
-      <p:pic>
-        <p:nvPicPr>
-          <p:cNvPr id="7" name="Imagen 6">
-            <a:extLst>
-              <a:ext uri="{FF2B5EF4-FFF2-40B4-BE49-F238E27FC236}">
-                <a16:creationId xmlns:a16="http://schemas.microsoft.com/office/drawing/2014/main" id="{F7B33ED2-9031-DDDE-A24F-D4ECC24B4887}"/>
-              </a:ext>
-            </a:extLst>
-          </p:cNvPr>
-          <p:cNvPicPr>
-            <a:picLocks noChangeAspect="1"/>
-          </p:cNvPicPr>
-          <p:nvPr/>
-        </p:nvPicPr>
-        <p:blipFill rotWithShape="1">
-          <a:blip r:embed="rId3" cstate="hqprint">
-            <a:extLst>
-              <a:ext uri="{28A0092B-C50C-407E-A947-70E740481C1C}">
-                <a14:useLocalDpi xmlns:a14="http://schemas.microsoft.com/office/drawing/2010/main"/>
-              </a:ext>
-            </a:extLst>
-          </a:blip>
-          <a:srcRect/>
-          <a:stretch/>
-        </p:blipFill>
+        </p:nvSpPr>
         <p:spPr>
           <a:xfrm>
-            <a:off x="3523762" y="1087958"/>
-            <a:ext cx="6012199" cy="5049704"/>
-          </a:xfrm>
-          <a:prstGeom prst="rect">
-            <a:avLst/>
-          </a:prstGeom>
-        </p:spPr>
-      </p:pic>
-      <p:sp>
-        <p:nvSpPr>
-          <p:cNvPr id="8" name="Elipse 7">
-            <a:extLst>
-              <a:ext uri="{FF2B5EF4-FFF2-40B4-BE49-F238E27FC236}">
-                <a16:creationId xmlns:a16="http://schemas.microsoft.com/office/drawing/2014/main" id="{3E1A7EE9-632A-A313-1662-F88CF1EB18C3}"/>
-              </a:ext>
-            </a:extLst>
-          </p:cNvPr>
-          <p:cNvSpPr/>
-          <p:nvPr/>
-        </p:nvSpPr>
-        <p:spPr>
-          <a:xfrm>
-            <a:off x="1702194" y="2252321"/>
-            <a:ext cx="1115992" cy="1583079"/>
-          </a:xfrm>
-          <a:prstGeom prst="ellipse">
-            <a:avLst/>
-          </a:prstGeom>
-          <a:noFill/>
-          <a:ln>
-            <a:solidFill>
-              <a:srgbClr val="FF0000"/>
-            </a:solidFill>
-          </a:ln>
-        </p:spPr>
-        <p:style>
-          <a:lnRef idx="2">
-            <a:schemeClr val="accent1">
-              <a:shade val="50000"/>
-            </a:schemeClr>
-          </a:lnRef>
-          <a:fillRef idx="1">
-            <a:schemeClr val="accent1"/>
-          </a:fillRef>
-          <a:effectRef idx="0">
-            <a:schemeClr val="accent1"/>
-          </a:effectRef>
-          <a:fontRef idx="minor">
-            <a:schemeClr val="lt1"/>
-          </a:fontRef>
-        </p:style>
-        <p:txBody>
-          <a:bodyPr rtlCol="0" anchor="ctr"/>
-          <a:lstStyle/>
-          <a:p>
-            <a:pPr algn="ctr"/>
-            <a:endParaRPr lang="es-ES" sz="1950"/>
-          </a:p>
-        </p:txBody>
-      </p:sp>
-      <p:cxnSp>
-        <p:nvCxnSpPr>
-          <p:cNvPr id="9" name="Conector recto de flecha 8">
-            <a:extLst>
-              <a:ext uri="{FF2B5EF4-FFF2-40B4-BE49-F238E27FC236}">
-                <a16:creationId xmlns:a16="http://schemas.microsoft.com/office/drawing/2014/main" id="{5CC35425-864E-51CB-8297-D1F64E3D9FFA}"/>
-              </a:ext>
-            </a:extLst>
-          </p:cNvPr>
-          <p:cNvCxnSpPr>
-            <a:cxnSpLocks/>
-            <a:stCxn id="8" idx="6"/>
-          </p:cNvCxnSpPr>
-          <p:nvPr/>
-        </p:nvCxnSpPr>
-        <p:spPr>
-          <a:xfrm>
-            <a:off x="2818186" y="3043861"/>
-            <a:ext cx="1107269" cy="0"/>
-          </a:xfrm>
-          <a:prstGeom prst="straightConnector1">
-            <a:avLst/>
-          </a:prstGeom>
-          <a:ln>
-            <a:solidFill>
-              <a:srgbClr val="FF0000"/>
-            </a:solidFill>
-            <a:tailEnd type="triangle"/>
-          </a:ln>
-        </p:spPr>
-        <p:style>
-          <a:lnRef idx="1">
-            <a:schemeClr val="accent1"/>
-          </a:lnRef>
-          <a:fillRef idx="0">
-            <a:schemeClr val="accent1"/>
-          </a:fillRef>
-          <a:effectRef idx="0">
-            <a:schemeClr val="accent1"/>
-          </a:effectRef>
-          <a:fontRef idx="minor">
-            <a:schemeClr val="tx1"/>
-          </a:fontRef>
-        </p:style>
-      </p:cxnSp>
-      <p:sp>
-        <p:nvSpPr>
-          <p:cNvPr id="10" name="CuadroTexto 9">
-            <a:extLst>
-              <a:ext uri="{FF2B5EF4-FFF2-40B4-BE49-F238E27FC236}">
-                <a16:creationId xmlns:a16="http://schemas.microsoft.com/office/drawing/2014/main" id="{A1B7E1A6-4C90-E515-8D5D-5612F7DD1503}"/>
-              </a:ext>
-            </a:extLst>
-          </p:cNvPr>
-          <p:cNvSpPr txBox="1"/>
-          <p:nvPr/>
-        </p:nvSpPr>
-        <p:spPr>
-          <a:xfrm>
-            <a:off x="4608910" y="6089606"/>
-            <a:ext cx="5366794" cy="366767"/>
-          </a:xfrm>
-          <a:prstGeom prst="rect">
-            <a:avLst/>
-          </a:prstGeom>
-          <a:noFill/>
-          <a:ln>
-            <a:noFill/>
-          </a:ln>
-        </p:spPr>
-        <p:txBody>
-          <a:bodyPr spcFirstLastPara="1" wrap="square" lIns="99044" tIns="49508" rIns="99044" bIns="49508" anchor="ctr" anchorCtr="0">
-            <a:noAutofit/>
-          </a:bodyPr>
-          <a:lstStyle>
-            <a:defPPr marR="0" lvl="0" algn="l" rtl="0">
-              <a:lnSpc>
-                <a:spcPct val="100000"/>
-              </a:lnSpc>
-              <a:spcBef>
-                <a:spcPts val="0"/>
-              </a:spcBef>
-              <a:spcAft>
-                <a:spcPts val="0"/>
-              </a:spcAft>
-              <a:defRPr/>
-            </a:defPPr>
-            <a:lvl1pPr>
-              <a:buSzPts val="1400"/>
-              <a:buNone/>
-              <a:defRPr sz="800" i="1">
-                <a:solidFill>
-                  <a:srgbClr val="00A3AD"/>
-                </a:solidFill>
-              </a:defRPr>
-            </a:lvl1pPr>
-            <a:lvl2pPr>
-              <a:buSzPts val="1400"/>
-              <a:buNone/>
-              <a:defRPr sz="1800">
-                <a:solidFill>
-                  <a:schemeClr val="dk1"/>
-                </a:solidFill>
-                <a:latin typeface="Calibri"/>
-                <a:ea typeface="Calibri"/>
-                <a:cs typeface="Calibri"/>
-              </a:defRPr>
-            </a:lvl2pPr>
-            <a:lvl3pPr>
-              <a:buSzPts val="1400"/>
-              <a:buNone/>
-              <a:defRPr sz="1800">
-                <a:solidFill>
-                  <a:schemeClr val="dk1"/>
-                </a:solidFill>
-                <a:latin typeface="Calibri"/>
-                <a:ea typeface="Calibri"/>
-                <a:cs typeface="Calibri"/>
-              </a:defRPr>
-            </a:lvl3pPr>
-            <a:lvl4pPr>
-              <a:buSzPts val="1400"/>
-              <a:buNone/>
-              <a:defRPr sz="1800">
-                <a:solidFill>
-                  <a:schemeClr val="dk1"/>
-                </a:solidFill>
-                <a:latin typeface="Calibri"/>
-                <a:ea typeface="Calibri"/>
-                <a:cs typeface="Calibri"/>
-              </a:defRPr>
-            </a:lvl4pPr>
-            <a:lvl5pPr>
-              <a:buSzPts val="1400"/>
-              <a:buNone/>
-              <a:defRPr sz="1800">
-                <a:solidFill>
-                  <a:schemeClr val="dk1"/>
-                </a:solidFill>
-                <a:latin typeface="Calibri"/>
-                <a:ea typeface="Calibri"/>
-                <a:cs typeface="Calibri"/>
-              </a:defRPr>
-            </a:lvl5pPr>
-            <a:lvl6pPr>
-              <a:buSzPts val="1400"/>
-              <a:buNone/>
-              <a:defRPr sz="1800">
-                <a:solidFill>
-                  <a:schemeClr val="dk1"/>
-                </a:solidFill>
-                <a:latin typeface="Calibri"/>
-                <a:ea typeface="Calibri"/>
-                <a:cs typeface="Calibri"/>
-              </a:defRPr>
-            </a:lvl6pPr>
-            <a:lvl7pPr>
-              <a:buSzPts val="1400"/>
-              <a:buNone/>
-              <a:defRPr sz="1800">
-                <a:solidFill>
-                  <a:schemeClr val="dk1"/>
-                </a:solidFill>
-                <a:latin typeface="Calibri"/>
-                <a:ea typeface="Calibri"/>
-                <a:cs typeface="Calibri"/>
-              </a:defRPr>
-            </a:lvl7pPr>
-            <a:lvl8pPr>
-              <a:buSzPts val="1400"/>
-              <a:buNone/>
-              <a:defRPr sz="1800">
-                <a:solidFill>
-                  <a:schemeClr val="dk1"/>
-                </a:solidFill>
-                <a:latin typeface="Calibri"/>
-                <a:ea typeface="Calibri"/>
-                <a:cs typeface="Calibri"/>
-              </a:defRPr>
-            </a:lvl8pPr>
-            <a:lvl9pPr>
-              <a:buSzPts val="1400"/>
-              <a:buNone/>
-              <a:defRPr sz="1800">
-                <a:solidFill>
-                  <a:schemeClr val="dk1"/>
-                </a:solidFill>
-                <a:latin typeface="Calibri"/>
-                <a:ea typeface="Calibri"/>
-                <a:cs typeface="Calibri"/>
-              </a:defRPr>
-            </a:lvl9pPr>
-          </a:lstStyle>
-          <a:p>
-            <a:r>
-              <a:rPr lang="es-ES" sz="758" dirty="0" err="1">
-                <a:solidFill>
-                  <a:schemeClr val="accent2"/>
-                </a:solidFill>
-                <a:latin typeface="Arial Nova Light" panose="020B0304020202020204" pitchFamily="34" charset="0"/>
-                <a:cs typeface="Arial" panose="020B0604020202020204" pitchFamily="34" charset="0"/>
-              </a:rPr>
-              <a:t>Source</a:t>
-            </a:r>
-            <a:r>
-              <a:rPr lang="es-ES" sz="758" dirty="0">
-                <a:solidFill>
-                  <a:schemeClr val="accent2"/>
-                </a:solidFill>
-                <a:latin typeface="Arial Nova Light" panose="020B0304020202020204" pitchFamily="34" charset="0"/>
-                <a:cs typeface="Arial" panose="020B0604020202020204" pitchFamily="34" charset="0"/>
-              </a:rPr>
-              <a:t>: www.semanticscholar.org/paper/Washing-Machine-Design-Optimization-Based-on-Nyg%C3%A5rds/ee555ee9dad77f362e4fa5936f51a13829722d49</a:t>
-            </a:r>
-          </a:p>
-        </p:txBody>
-      </p:sp>
-      <p:sp>
-        <p:nvSpPr>
-          <p:cNvPr id="13" name="Rectángulo 12">
-            <a:extLst>
-              <a:ext uri="{FF2B5EF4-FFF2-40B4-BE49-F238E27FC236}">
-                <a16:creationId xmlns:a16="http://schemas.microsoft.com/office/drawing/2014/main" id="{88899365-2667-0273-790A-185B562266ED}"/>
-              </a:ext>
-            </a:extLst>
-          </p:cNvPr>
-          <p:cNvSpPr/>
-          <p:nvPr/>
-        </p:nvSpPr>
-        <p:spPr>
-          <a:xfrm>
-            <a:off x="183448" y="4252035"/>
+            <a:off x="457202" y="4427526"/>
             <a:ext cx="3529469" cy="1363322"/>
           </a:xfrm>
           <a:prstGeom prst="rect">
@@ -6331,67 +6422,140 @@
           </a:p>
         </p:txBody>
       </p:sp>
-      <p:sp>
-        <p:nvSpPr>
-          <p:cNvPr id="14" name="Rectángulo 13">
-            <a:extLst>
-              <a:ext uri="{FF2B5EF4-FFF2-40B4-BE49-F238E27FC236}">
-                <a16:creationId xmlns:a16="http://schemas.microsoft.com/office/drawing/2014/main" id="{F2CFA6DB-FDB5-4136-A7E0-91D06B7B2ED2}"/>
-              </a:ext>
-            </a:extLst>
-          </p:cNvPr>
-          <p:cNvSpPr/>
+      <p:cxnSp>
+        <p:nvCxnSpPr>
+          <p:cNvPr id="12" name="Conector recto de flecha 11">
+            <a:extLst>
+              <a:ext uri="{FF2B5EF4-FFF2-40B4-BE49-F238E27FC236}">
+                <a16:creationId xmlns:a16="http://schemas.microsoft.com/office/drawing/2014/main" id="{9ABF69C8-F8E8-19EE-4FD3-C42D04619E27}"/>
+              </a:ext>
+            </a:extLst>
+          </p:cNvPr>
+          <p:cNvCxnSpPr>
+            <a:cxnSpLocks/>
+          </p:cNvCxnSpPr>
           <p:nvPr/>
-        </p:nvSpPr>
+        </p:nvCxnSpPr>
         <p:spPr>
           <a:xfrm>
-            <a:off x="682313" y="1133711"/>
-            <a:ext cx="7994841" cy="496290"/>
+            <a:off x="5709737" y="2927927"/>
+            <a:ext cx="1113391" cy="1499599"/>
+          </a:xfrm>
+          <a:prstGeom prst="straightConnector1">
+            <a:avLst/>
+          </a:prstGeom>
+          <a:ln>
+            <a:tailEnd type="triangle"/>
+          </a:ln>
+        </p:spPr>
+        <p:style>
+          <a:lnRef idx="2">
+            <a:schemeClr val="accent6"/>
+          </a:lnRef>
+          <a:fillRef idx="0">
+            <a:schemeClr val="accent6"/>
+          </a:fillRef>
+          <a:effectRef idx="1">
+            <a:schemeClr val="accent6"/>
+          </a:effectRef>
+          <a:fontRef idx="minor">
+            <a:schemeClr val="tx1"/>
+          </a:fontRef>
+        </p:style>
+      </p:cxnSp>
+      <p:pic>
+        <p:nvPicPr>
+          <p:cNvPr id="11" name="Imagen 10">
+            <a:extLst>
+              <a:ext uri="{FF2B5EF4-FFF2-40B4-BE49-F238E27FC236}">
+                <a16:creationId xmlns:a16="http://schemas.microsoft.com/office/drawing/2014/main" id="{FC5C7EC9-20C4-9992-7937-CADED38DBD5F}"/>
+              </a:ext>
+            </a:extLst>
+          </p:cNvPr>
+          <p:cNvPicPr>
+            <a:picLocks noChangeAspect="1"/>
+          </p:cNvPicPr>
+          <p:nvPr/>
+        </p:nvPicPr>
+        <p:blipFill>
+          <a:blip r:embed="rId2"/>
+          <a:stretch>
+            <a:fillRect/>
+          </a:stretch>
+        </p:blipFill>
+        <p:spPr>
+          <a:xfrm>
+            <a:off x="420502" y="1619426"/>
+            <a:ext cx="6402626" cy="2195186"/>
           </a:xfrm>
           <a:prstGeom prst="rect">
             <a:avLst/>
           </a:prstGeom>
         </p:spPr>
-        <p:txBody>
-          <a:bodyPr wrap="square" lIns="99060" tIns="49530" rIns="99060" bIns="49530" anchor="t">
-            <a:spAutoFit/>
-          </a:bodyPr>
-          <a:lstStyle/>
-          <a:p>
-            <a:pPr>
-              <a:lnSpc>
-                <a:spcPct val="130000"/>
-              </a:lnSpc>
-              <a:spcBef>
-                <a:spcPts val="542"/>
-              </a:spcBef>
-              <a:buClr>
-                <a:srgbClr val="00A3AE"/>
-              </a:buClr>
-              <a:buSzPts val="2000"/>
-            </a:pPr>
-            <a:r>
-              <a:rPr lang="en-US" sz="2167" dirty="0">
-                <a:solidFill>
-                  <a:srgbClr val="004851"/>
-                </a:solidFill>
-                <a:latin typeface="Arial Nova Light" panose="020B0304020202020204" pitchFamily="34" charset="0"/>
-                <a:cs typeface="Arial" panose="020B0604020202020204" pitchFamily="34" charset="0"/>
-              </a:rPr>
-              <a:t>Example: washing machine</a:t>
-            </a:r>
-            <a:endParaRPr lang="es-ES" sz="1517" dirty="0">
-              <a:solidFill>
-                <a:srgbClr val="004851"/>
-              </a:solidFill>
-            </a:endParaRPr>
-          </a:p>
-        </p:txBody>
-      </p:sp>
+      </p:pic>
+      <p:pic>
+        <p:nvPicPr>
+          <p:cNvPr id="13" name="Imagen 12">
+            <a:extLst>
+              <a:ext uri="{FF2B5EF4-FFF2-40B4-BE49-F238E27FC236}">
+                <a16:creationId xmlns:a16="http://schemas.microsoft.com/office/drawing/2014/main" id="{7344A7C7-229A-5F37-CDDD-86C4D41EB64E}"/>
+              </a:ext>
+            </a:extLst>
+          </p:cNvPr>
+          <p:cNvPicPr>
+            <a:picLocks noChangeAspect="1"/>
+          </p:cNvPicPr>
+          <p:nvPr/>
+        </p:nvPicPr>
+        <p:blipFill>
+          <a:blip r:embed="rId3"/>
+          <a:stretch>
+            <a:fillRect/>
+          </a:stretch>
+        </p:blipFill>
+        <p:spPr>
+          <a:xfrm>
+            <a:off x="7219950" y="1736224"/>
+            <a:ext cx="2075289" cy="1556467"/>
+          </a:xfrm>
+          <a:prstGeom prst="rect">
+            <a:avLst/>
+          </a:prstGeom>
+        </p:spPr>
+      </p:pic>
+      <p:pic>
+        <p:nvPicPr>
+          <p:cNvPr id="14" name="Imagen 13">
+            <a:extLst>
+              <a:ext uri="{FF2B5EF4-FFF2-40B4-BE49-F238E27FC236}">
+                <a16:creationId xmlns:a16="http://schemas.microsoft.com/office/drawing/2014/main" id="{8E6D316B-DF67-1D05-28D8-2424A30335BE}"/>
+              </a:ext>
+            </a:extLst>
+          </p:cNvPr>
+          <p:cNvPicPr>
+            <a:picLocks noChangeAspect="1"/>
+          </p:cNvPicPr>
+          <p:nvPr/>
+        </p:nvPicPr>
+        <p:blipFill rotWithShape="1">
+          <a:blip r:embed="rId3"/>
+          <a:srcRect l="38986" t="38982" r="43205" b="33202"/>
+          <a:stretch/>
+        </p:blipFill>
+        <p:spPr>
+          <a:xfrm>
+            <a:off x="6972012" y="3565310"/>
+            <a:ext cx="2228848" cy="2610987"/>
+          </a:xfrm>
+          <a:prstGeom prst="rect">
+            <a:avLst/>
+          </a:prstGeom>
+        </p:spPr>
+      </p:pic>
     </p:spTree>
     <p:extLst>
       <p:ext uri="{BB962C8B-B14F-4D97-AF65-F5344CB8AC3E}">
-        <p14:creationId xmlns:p14="http://schemas.microsoft.com/office/powerpoint/2010/main" val="1439006654"/>
+        <p14:creationId xmlns:p14="http://schemas.microsoft.com/office/powerpoint/2010/main" val="4259492674"/>
       </p:ext>
     </p:extLst>
   </p:cSld>
@@ -6420,98 +6584,10 @@
       </p:grpSpPr>
       <p:sp>
         <p:nvSpPr>
-          <p:cNvPr id="2" name="Marcador de fecha 1">
-            <a:extLst>
-              <a:ext uri="{FF2B5EF4-FFF2-40B4-BE49-F238E27FC236}">
-                <a16:creationId xmlns:a16="http://schemas.microsoft.com/office/drawing/2014/main" id="{C317228A-0183-9B76-263B-FCEB5CAA2433}"/>
-              </a:ext>
-            </a:extLst>
-          </p:cNvPr>
-          <p:cNvSpPr>
-            <a:spLocks noGrp="1"/>
-          </p:cNvSpPr>
-          <p:nvPr>
-            <p:ph type="dt" sz="half" idx="10"/>
-          </p:nvPr>
-        </p:nvSpPr>
-        <p:spPr/>
-        <p:txBody>
-          <a:bodyPr/>
-          <a:lstStyle/>
-          <a:p>
-            <a:r>
-              <a:rPr lang="es-ES"/>
-              <a:t>MSIE 2022-2023</a:t>
-            </a:r>
-            <a:endParaRPr lang="en-US" dirty="0"/>
-          </a:p>
-        </p:txBody>
-      </p:sp>
-      <p:sp>
-        <p:nvSpPr>
-          <p:cNvPr id="3" name="Marcador de pie de página 2">
-            <a:extLst>
-              <a:ext uri="{FF2B5EF4-FFF2-40B4-BE49-F238E27FC236}">
-                <a16:creationId xmlns:a16="http://schemas.microsoft.com/office/drawing/2014/main" id="{D261DD60-1E3E-07A8-3364-D22012500BF1}"/>
-              </a:ext>
-            </a:extLst>
-          </p:cNvPr>
-          <p:cNvSpPr>
-            <a:spLocks noGrp="1"/>
-          </p:cNvSpPr>
-          <p:nvPr>
-            <p:ph type="ftr" sz="quarter" idx="11"/>
-          </p:nvPr>
-        </p:nvSpPr>
-        <p:spPr/>
-        <p:txBody>
-          <a:bodyPr/>
-          <a:lstStyle/>
-          <a:p>
-            <a:r>
-              <a:rPr lang="en-US"/>
-              <a:t>Testing and validation platforms - Architecture </a:t>
-            </a:r>
-            <a:endParaRPr lang="en-US" dirty="0"/>
-          </a:p>
-        </p:txBody>
-      </p:sp>
-      <p:sp>
-        <p:nvSpPr>
-          <p:cNvPr id="4" name="Marcador de número de diapositiva 3">
-            <a:extLst>
-              <a:ext uri="{FF2B5EF4-FFF2-40B4-BE49-F238E27FC236}">
-                <a16:creationId xmlns:a16="http://schemas.microsoft.com/office/drawing/2014/main" id="{BBC66C7F-D340-823B-AAD4-6735F54B9FAA}"/>
-              </a:ext>
-            </a:extLst>
-          </p:cNvPr>
-          <p:cNvSpPr>
-            <a:spLocks noGrp="1"/>
-          </p:cNvSpPr>
-          <p:nvPr>
-            <p:ph type="sldNum" sz="quarter" idx="12"/>
-          </p:nvPr>
-        </p:nvSpPr>
-        <p:spPr/>
-        <p:txBody>
-          <a:bodyPr/>
-          <a:lstStyle/>
-          <a:p>
-            <a:fld id="{F7356FEA-1119-414E-9BDA-0F3F06B9EA58}" type="slidenum">
-              <a:rPr lang="en-US" smtClean="0"/>
-              <a:pPr/>
-              <a:t>14</a:t>
-            </a:fld>
-            <a:endParaRPr lang="en-US"/>
-          </a:p>
-        </p:txBody>
-      </p:sp>
-      <p:sp>
-        <p:nvSpPr>
-          <p:cNvPr id="5" name="Título 4">
-            <a:extLst>
-              <a:ext uri="{FF2B5EF4-FFF2-40B4-BE49-F238E27FC236}">
-                <a16:creationId xmlns:a16="http://schemas.microsoft.com/office/drawing/2014/main" id="{58E7A739-7B37-E8CF-C038-F6B09B115485}"/>
+          <p:cNvPr id="2" name="Título 1">
+            <a:extLst>
+              <a:ext uri="{FF2B5EF4-FFF2-40B4-BE49-F238E27FC236}">
+                <a16:creationId xmlns:a16="http://schemas.microsoft.com/office/drawing/2014/main" id="{07474B84-1C1E-B57A-C422-3320F905C99A}"/>
               </a:ext>
             </a:extLst>
           </p:cNvPr>
@@ -6528,235 +6604,74 @@
           <a:lstStyle/>
           <a:p>
             <a:r>
-              <a:rPr lang="es-ES" dirty="0" err="1"/>
-              <a:t>Decomposition</a:t>
-            </a:r>
+              <a:rPr lang="es-ES"/>
+              <a:t>View Types</a:t>
+            </a:r>
+          </a:p>
+        </p:txBody>
+      </p:sp>
+      <p:sp>
+        <p:nvSpPr>
+          <p:cNvPr id="3" name="Marcador de texto 2">
+            <a:extLst>
+              <a:ext uri="{FF2B5EF4-FFF2-40B4-BE49-F238E27FC236}">
+                <a16:creationId xmlns:a16="http://schemas.microsoft.com/office/drawing/2014/main" id="{36215401-2A5E-BB61-9346-3AC700EB2BF5}"/>
+              </a:ext>
+            </a:extLst>
+          </p:cNvPr>
+          <p:cNvSpPr>
+            <a:spLocks noGrp="1"/>
+          </p:cNvSpPr>
+          <p:nvPr>
+            <p:ph type="body" idx="1"/>
+          </p:nvPr>
+        </p:nvSpPr>
+        <p:spPr/>
+        <p:txBody>
+          <a:bodyPr/>
+          <a:lstStyle/>
+          <a:p>
+            <a:r>
+              <a:rPr lang="es-ES"/>
+              <a:t>Analysis of System Architecture</a:t>
+            </a:r>
+          </a:p>
+        </p:txBody>
+      </p:sp>
+      <p:sp>
+        <p:nvSpPr>
+          <p:cNvPr id="4" name="Marcador de contenido 3">
+            <a:extLst>
+              <a:ext uri="{FF2B5EF4-FFF2-40B4-BE49-F238E27FC236}">
+                <a16:creationId xmlns:a16="http://schemas.microsoft.com/office/drawing/2014/main" id="{804F76D0-EACF-366A-C7C0-111F4D3DF0CA}"/>
+              </a:ext>
+            </a:extLst>
+          </p:cNvPr>
+          <p:cNvSpPr>
+            <a:spLocks noGrp="1"/>
+          </p:cNvSpPr>
+          <p:nvPr>
+            <p:ph sz="quarter" idx="10"/>
+          </p:nvPr>
+        </p:nvSpPr>
+        <p:spPr/>
+        <p:txBody>
+          <a:bodyPr>
+            <a:normAutofit fontScale="85000" lnSpcReduction="10000"/>
+          </a:bodyPr>
+          <a:lstStyle/>
+          <a:p>
             <a:r>
               <a:rPr lang="es-ES" dirty="0"/>
-              <a:t> </a:t>
-            </a:r>
-            <a:r>
-              <a:rPr lang="es-ES" dirty="0" err="1"/>
-              <a:t>hierarchy</a:t>
-            </a:r>
-            <a:endParaRPr lang="es-ES" dirty="0"/>
-          </a:p>
-        </p:txBody>
-      </p:sp>
-      <p:pic>
-        <p:nvPicPr>
-          <p:cNvPr id="8" name="Picture 2" descr="Common Washing Machine Problems And Cures">
-            <a:extLst>
-              <a:ext uri="{FF2B5EF4-FFF2-40B4-BE49-F238E27FC236}">
-                <a16:creationId xmlns:a16="http://schemas.microsoft.com/office/drawing/2014/main" id="{58A0D5A7-115D-6353-90BE-2291827E4B26}"/>
-              </a:ext>
-            </a:extLst>
-          </p:cNvPr>
-          <p:cNvPicPr>
-            <a:picLocks noChangeAspect="1" noChangeArrowheads="1"/>
-          </p:cNvPicPr>
-          <p:nvPr/>
-        </p:nvPicPr>
-        <p:blipFill>
-          <a:blip r:embed="rId2">
-            <a:extLst>
-              <a:ext uri="{28A0092B-C50C-407E-A947-70E740481C1C}">
-                <a14:useLocalDpi xmlns:a14="http://schemas.microsoft.com/office/drawing/2010/main"/>
-              </a:ext>
-            </a:extLst>
-          </a:blip>
-          <a:srcRect/>
-          <a:stretch>
-            <a:fillRect/>
-          </a:stretch>
-        </p:blipFill>
-        <p:spPr bwMode="auto">
-          <a:xfrm>
-            <a:off x="7169713" y="1132001"/>
-            <a:ext cx="2568190" cy="2794013"/>
-          </a:xfrm>
-          <a:prstGeom prst="rect">
-            <a:avLst/>
-          </a:prstGeom>
-          <a:noFill/>
-          <a:extLst>
-            <a:ext uri="{909E8E84-426E-40DD-AFC4-6F175D3DCCD1}">
-              <a14:hiddenFill xmlns:a14="http://schemas.microsoft.com/office/drawing/2010/main">
-                <a:solidFill>
-                  <a:srgbClr val="FFFFFF"/>
-                </a:solidFill>
-              </a14:hiddenFill>
-            </a:ext>
-          </a:extLst>
-        </p:spPr>
-      </p:pic>
-      <p:pic>
-        <p:nvPicPr>
-          <p:cNvPr id="6" name="Imagen 5">
-            <a:extLst>
-              <a:ext uri="{FF2B5EF4-FFF2-40B4-BE49-F238E27FC236}">
-                <a16:creationId xmlns:a16="http://schemas.microsoft.com/office/drawing/2014/main" id="{2A227371-F4D3-A5B8-FF8A-FFACA871132D}"/>
-              </a:ext>
-            </a:extLst>
-          </p:cNvPr>
-          <p:cNvPicPr>
-            <a:picLocks noChangeAspect="1"/>
-          </p:cNvPicPr>
-          <p:nvPr/>
-        </p:nvPicPr>
-        <p:blipFill>
-          <a:blip r:embed="rId3"/>
-          <a:stretch>
-            <a:fillRect/>
-          </a:stretch>
-        </p:blipFill>
-        <p:spPr>
-          <a:xfrm>
-            <a:off x="279308" y="1354931"/>
-            <a:ext cx="6752379" cy="3005993"/>
-          </a:xfrm>
-          <a:prstGeom prst="rect">
-            <a:avLst/>
-          </a:prstGeom>
-        </p:spPr>
-      </p:pic>
-      <p:pic>
-        <p:nvPicPr>
-          <p:cNvPr id="9" name="Imagen 8">
-            <a:extLst>
-              <a:ext uri="{FF2B5EF4-FFF2-40B4-BE49-F238E27FC236}">
-                <a16:creationId xmlns:a16="http://schemas.microsoft.com/office/drawing/2014/main" id="{2125F017-10AC-1335-7855-74B92869CE4E}"/>
-              </a:ext>
-            </a:extLst>
-          </p:cNvPr>
-          <p:cNvPicPr>
-            <a:picLocks noChangeAspect="1"/>
-          </p:cNvPicPr>
-          <p:nvPr/>
-        </p:nvPicPr>
-        <p:blipFill rotWithShape="1">
-          <a:blip r:embed="rId4" cstate="hqprint">
-            <a:extLst>
-              <a:ext uri="{28A0092B-C50C-407E-A947-70E740481C1C}">
-                <a14:useLocalDpi xmlns:a14="http://schemas.microsoft.com/office/drawing/2010/main"/>
-              </a:ext>
-            </a:extLst>
-          </a:blip>
-          <a:srcRect/>
-          <a:stretch/>
-        </p:blipFill>
-        <p:spPr>
-          <a:xfrm>
-            <a:off x="6823128" y="4038034"/>
-            <a:ext cx="3052946" cy="2564199"/>
-          </a:xfrm>
-          <a:prstGeom prst="rect">
-            <a:avLst/>
-          </a:prstGeom>
-        </p:spPr>
-      </p:pic>
-      <p:sp>
-        <p:nvSpPr>
-          <p:cNvPr id="10" name="Rectángulo 9">
-            <a:extLst>
-              <a:ext uri="{FF2B5EF4-FFF2-40B4-BE49-F238E27FC236}">
-                <a16:creationId xmlns:a16="http://schemas.microsoft.com/office/drawing/2014/main" id="{40592393-083B-5C7E-29F0-332B1655017B}"/>
-              </a:ext>
-            </a:extLst>
-          </p:cNvPr>
-          <p:cNvSpPr/>
-          <p:nvPr/>
-        </p:nvSpPr>
-        <p:spPr>
-          <a:xfrm>
-            <a:off x="457202" y="4427526"/>
-            <a:ext cx="3529469" cy="1363322"/>
-          </a:xfrm>
-          <a:prstGeom prst="rect">
-            <a:avLst/>
-          </a:prstGeom>
-        </p:spPr>
-        <p:txBody>
-          <a:bodyPr wrap="square" lIns="99060" tIns="49530" rIns="99060" bIns="49530" anchor="t">
-            <a:spAutoFit/>
-          </a:bodyPr>
-          <a:lstStyle/>
-          <a:p>
-            <a:pPr>
-              <a:lnSpc>
-                <a:spcPct val="130000"/>
-              </a:lnSpc>
-              <a:spcBef>
-                <a:spcPts val="542"/>
-              </a:spcBef>
-              <a:buClr>
-                <a:srgbClr val="00A3AE"/>
-              </a:buClr>
-              <a:buSzPts val="2000"/>
-            </a:pPr>
-            <a:r>
-              <a:rPr lang="en-US" sz="2167" dirty="0">
-                <a:solidFill>
-                  <a:srgbClr val="004851"/>
-                </a:solidFill>
-                <a:latin typeface="Arial Nova Light" panose="020B0304020202020204" pitchFamily="34" charset="0"/>
-                <a:cs typeface="Arial" panose="020B0604020202020204" pitchFamily="34" charset="0"/>
-              </a:rPr>
-              <a:t>Each subsystem is decomposed and organized in hierarchies</a:t>
-            </a:r>
-            <a:endParaRPr lang="es-ES" sz="1517" dirty="0">
-              <a:solidFill>
-                <a:srgbClr val="004851"/>
-              </a:solidFill>
-            </a:endParaRPr>
-          </a:p>
-        </p:txBody>
-      </p:sp>
-      <p:cxnSp>
-        <p:nvCxnSpPr>
-          <p:cNvPr id="12" name="Conector recto de flecha 11">
-            <a:extLst>
-              <a:ext uri="{FF2B5EF4-FFF2-40B4-BE49-F238E27FC236}">
-                <a16:creationId xmlns:a16="http://schemas.microsoft.com/office/drawing/2014/main" id="{9ABF69C8-F8E8-19EE-4FD3-C42D04619E27}"/>
-              </a:ext>
-            </a:extLst>
-          </p:cNvPr>
-          <p:cNvCxnSpPr>
-            <a:cxnSpLocks/>
-          </p:cNvCxnSpPr>
-          <p:nvPr/>
-        </p:nvCxnSpPr>
-        <p:spPr>
-          <a:xfrm>
-            <a:off x="1819564" y="2927927"/>
-            <a:ext cx="5212123" cy="1884218"/>
-          </a:xfrm>
-          <a:prstGeom prst="straightConnector1">
-            <a:avLst/>
-          </a:prstGeom>
-          <a:ln>
-            <a:tailEnd type="triangle"/>
-          </a:ln>
-        </p:spPr>
-        <p:style>
-          <a:lnRef idx="2">
-            <a:schemeClr val="accent6"/>
-          </a:lnRef>
-          <a:fillRef idx="0">
-            <a:schemeClr val="accent6"/>
-          </a:fillRef>
-          <a:effectRef idx="1">
-            <a:schemeClr val="accent6"/>
-          </a:effectRef>
-          <a:fontRef idx="minor">
-            <a:schemeClr val="tx1"/>
-          </a:fontRef>
-        </p:style>
-      </p:cxnSp>
+              <a:t>2.2</a:t>
+            </a:r>
+          </a:p>
+        </p:txBody>
+      </p:sp>
     </p:spTree>
     <p:extLst>
       <p:ext uri="{BB962C8B-B14F-4D97-AF65-F5344CB8AC3E}">
-        <p14:creationId xmlns:p14="http://schemas.microsoft.com/office/powerpoint/2010/main" val="4259492674"/>
+        <p14:creationId xmlns:p14="http://schemas.microsoft.com/office/powerpoint/2010/main" val="1623582718"/>
       </p:ext>
     </p:extLst>
   </p:cSld>
@@ -6785,122 +6700,6 @@
       </p:grpSpPr>
       <p:sp>
         <p:nvSpPr>
-          <p:cNvPr id="2" name="Título 1">
-            <a:extLst>
-              <a:ext uri="{FF2B5EF4-FFF2-40B4-BE49-F238E27FC236}">
-                <a16:creationId xmlns:a16="http://schemas.microsoft.com/office/drawing/2014/main" id="{07474B84-1C1E-B57A-C422-3320F905C99A}"/>
-              </a:ext>
-            </a:extLst>
-          </p:cNvPr>
-          <p:cNvSpPr>
-            <a:spLocks noGrp="1"/>
-          </p:cNvSpPr>
-          <p:nvPr>
-            <p:ph type="title"/>
-          </p:nvPr>
-        </p:nvSpPr>
-        <p:spPr/>
-        <p:txBody>
-          <a:bodyPr/>
-          <a:lstStyle/>
-          <a:p>
-            <a:r>
-              <a:rPr lang="es-ES"/>
-              <a:t>View Types</a:t>
-            </a:r>
-          </a:p>
-        </p:txBody>
-      </p:sp>
-      <p:sp>
-        <p:nvSpPr>
-          <p:cNvPr id="3" name="Marcador de texto 2">
-            <a:extLst>
-              <a:ext uri="{FF2B5EF4-FFF2-40B4-BE49-F238E27FC236}">
-                <a16:creationId xmlns:a16="http://schemas.microsoft.com/office/drawing/2014/main" id="{36215401-2A5E-BB61-9346-3AC700EB2BF5}"/>
-              </a:ext>
-            </a:extLst>
-          </p:cNvPr>
-          <p:cNvSpPr>
-            <a:spLocks noGrp="1"/>
-          </p:cNvSpPr>
-          <p:nvPr>
-            <p:ph type="body" idx="1"/>
-          </p:nvPr>
-        </p:nvSpPr>
-        <p:spPr/>
-        <p:txBody>
-          <a:bodyPr/>
-          <a:lstStyle/>
-          <a:p>
-            <a:r>
-              <a:rPr lang="es-ES"/>
-              <a:t>Analysis of System Architecture</a:t>
-            </a:r>
-          </a:p>
-        </p:txBody>
-      </p:sp>
-      <p:sp>
-        <p:nvSpPr>
-          <p:cNvPr id="4" name="Marcador de contenido 3">
-            <a:extLst>
-              <a:ext uri="{FF2B5EF4-FFF2-40B4-BE49-F238E27FC236}">
-                <a16:creationId xmlns:a16="http://schemas.microsoft.com/office/drawing/2014/main" id="{804F76D0-EACF-366A-C7C0-111F4D3DF0CA}"/>
-              </a:ext>
-            </a:extLst>
-          </p:cNvPr>
-          <p:cNvSpPr>
-            <a:spLocks noGrp="1"/>
-          </p:cNvSpPr>
-          <p:nvPr>
-            <p:ph sz="quarter" idx="10"/>
-          </p:nvPr>
-        </p:nvSpPr>
-        <p:spPr/>
-        <p:txBody>
-          <a:bodyPr>
-            <a:normAutofit fontScale="85000" lnSpcReduction="10000"/>
-          </a:bodyPr>
-          <a:lstStyle/>
-          <a:p>
-            <a:r>
-              <a:rPr lang="es-ES" dirty="0"/>
-              <a:t>2.2</a:t>
-            </a:r>
-          </a:p>
-        </p:txBody>
-      </p:sp>
-    </p:spTree>
-    <p:extLst>
-      <p:ext uri="{BB962C8B-B14F-4D97-AF65-F5344CB8AC3E}">
-        <p14:creationId xmlns:p14="http://schemas.microsoft.com/office/powerpoint/2010/main" val="1623582718"/>
-      </p:ext>
-    </p:extLst>
-  </p:cSld>
-  <p:clrMapOvr>
-    <a:masterClrMapping/>
-  </p:clrMapOvr>
-</p:sld>
-</file>
-
-<file path=ppt/slides/slide16.xml><?xml version="1.0" encoding="utf-8"?>
-<p:sld xmlns:a="http://schemas.openxmlformats.org/drawingml/2006/main" xmlns:r="http://schemas.openxmlformats.org/officeDocument/2006/relationships" xmlns:p="http://schemas.openxmlformats.org/presentationml/2006/main">
-  <p:cSld>
-    <p:spTree>
-      <p:nvGrpSpPr>
-        <p:cNvPr id="1" name=""/>
-        <p:cNvGrpSpPr/>
-        <p:nvPr/>
-      </p:nvGrpSpPr>
-      <p:grpSpPr>
-        <a:xfrm>
-          <a:off x="0" y="0"/>
-          <a:ext cx="0" cy="0"/>
-          <a:chOff x="0" y="0"/>
-          <a:chExt cx="0" cy="0"/>
-        </a:xfrm>
-      </p:grpSpPr>
-      <p:sp>
-        <p:nvSpPr>
           <p:cNvPr id="2" name="Marcador de fecha 1">
             <a:extLst>
               <a:ext uri="{FF2B5EF4-FFF2-40B4-BE49-F238E27FC236}">
@@ -6981,7 +6780,7 @@
             <a:fld id="{F7356FEA-1119-414E-9BDA-0F3F06B9EA58}" type="slidenum">
               <a:rPr lang="en-US" smtClean="0"/>
               <a:pPr/>
-              <a:t>16</a:t>
+              <a:t>15</a:t>
             </a:fld>
             <a:endParaRPr lang="en-US"/>
           </a:p>
@@ -7142,7 +6941,7 @@
 </p:sld>
 </file>
 
-<file path=ppt/slides/slide17.xml><?xml version="1.0" encoding="utf-8"?>
+<file path=ppt/slides/slide16.xml><?xml version="1.0" encoding="utf-8"?>
 <p:sld xmlns:a="http://schemas.openxmlformats.org/drawingml/2006/main" xmlns:r="http://schemas.openxmlformats.org/officeDocument/2006/relationships" xmlns:p="http://schemas.openxmlformats.org/presentationml/2006/main">
   <p:cSld>
     <p:spTree>
@@ -7241,7 +7040,7 @@
             <a:fld id="{F7356FEA-1119-414E-9BDA-0F3F06B9EA58}" type="slidenum">
               <a:rPr lang="en-US" smtClean="0"/>
               <a:pPr/>
-              <a:t>17</a:t>
+              <a:t>16</a:t>
             </a:fld>
             <a:endParaRPr lang="en-US"/>
           </a:p>
@@ -7355,7 +7154,7 @@
 </p:sld>
 </file>
 
-<file path=ppt/slides/slide18.xml><?xml version="1.0" encoding="utf-8"?>
+<file path=ppt/slides/slide17.xml><?xml version="1.0" encoding="utf-8"?>
 <p:sld xmlns:a="http://schemas.openxmlformats.org/drawingml/2006/main" xmlns:r="http://schemas.openxmlformats.org/officeDocument/2006/relationships" xmlns:p="http://schemas.openxmlformats.org/presentationml/2006/main">
   <p:cSld>
     <p:spTree>
@@ -7494,7 +7293,7 @@
             <a:fld id="{F7356FEA-1119-414E-9BDA-0F3F06B9EA58}" type="slidenum">
               <a:rPr lang="en-US" smtClean="0"/>
               <a:pPr/>
-              <a:t>18</a:t>
+              <a:t>17</a:t>
             </a:fld>
             <a:endParaRPr lang="en-US"/>
           </a:p>
@@ -8047,7 +7846,7 @@
 </p:sld>
 </file>
 
-<file path=ppt/slides/slide19.xml><?xml version="1.0" encoding="utf-8"?>
+<file path=ppt/slides/slide18.xml><?xml version="1.0" encoding="utf-8"?>
 <p:sld xmlns:a="http://schemas.openxmlformats.org/drawingml/2006/main" xmlns:r="http://schemas.openxmlformats.org/officeDocument/2006/relationships" xmlns:p="http://schemas.openxmlformats.org/presentationml/2006/main">
   <p:cSld>
     <p:spTree>
@@ -8146,7 +7945,7 @@
             <a:fld id="{F7356FEA-1119-414E-9BDA-0F3F06B9EA58}" type="slidenum">
               <a:rPr lang="en-US" smtClean="0"/>
               <a:pPr/>
-              <a:t>19</a:t>
+              <a:t>18</a:t>
             </a:fld>
             <a:endParaRPr lang="en-US"/>
           </a:p>
@@ -8694,7 +8493,7 @@
 </p:sld>
 </file>
 
-<file path=ppt/slides/slide2.xml><?xml version="1.0" encoding="utf-8"?>
+<file path=ppt/slides/slide19.xml><?xml version="1.0" encoding="utf-8"?>
 <p:sld xmlns:a="http://schemas.openxmlformats.org/drawingml/2006/main" xmlns:r="http://schemas.openxmlformats.org/officeDocument/2006/relationships" xmlns:p="http://schemas.openxmlformats.org/presentationml/2006/main">
   <p:cSld>
     <p:spTree>
@@ -8716,7 +8515,7 @@
           <p:cNvPr id="2" name="Marcador de fecha 1">
             <a:extLst>
               <a:ext uri="{FF2B5EF4-FFF2-40B4-BE49-F238E27FC236}">
-                <a16:creationId xmlns:a16="http://schemas.microsoft.com/office/drawing/2014/main" id="{38559273-7AB1-4A95-985D-22564E7DD5B1}"/>
+                <a16:creationId xmlns:a16="http://schemas.microsoft.com/office/drawing/2014/main" id="{2C8D63E8-D259-E69F-184D-44D4CD17D6AA}"/>
               </a:ext>
             </a:extLst>
           </p:cNvPr>
@@ -8745,7 +8544,7 @@
           <p:cNvPr id="3" name="Marcador de pie de página 2">
             <a:extLst>
               <a:ext uri="{FF2B5EF4-FFF2-40B4-BE49-F238E27FC236}">
-                <a16:creationId xmlns:a16="http://schemas.microsoft.com/office/drawing/2014/main" id="{45A5B9AB-2304-4735-B1EC-EE23ACF69CEE}"/>
+                <a16:creationId xmlns:a16="http://schemas.microsoft.com/office/drawing/2014/main" id="{046334FD-D8CB-83CE-B06B-B6FB2CA703F6}"/>
               </a:ext>
             </a:extLst>
           </p:cNvPr>
@@ -8774,7 +8573,7 @@
           <p:cNvPr id="4" name="Marcador de número de diapositiva 3">
             <a:extLst>
               <a:ext uri="{FF2B5EF4-FFF2-40B4-BE49-F238E27FC236}">
-                <a16:creationId xmlns:a16="http://schemas.microsoft.com/office/drawing/2014/main" id="{A87072F7-DE8E-43BB-B3B5-FE1120EAF2FA}"/>
+                <a16:creationId xmlns:a16="http://schemas.microsoft.com/office/drawing/2014/main" id="{F09EA907-5B8E-39B7-3DAE-9267CEA28EDE}"/>
               </a:ext>
             </a:extLst>
           </p:cNvPr>
@@ -8793,596 +8592,7 @@
             <a:fld id="{F7356FEA-1119-414E-9BDA-0F3F06B9EA58}" type="slidenum">
               <a:rPr lang="en-US" smtClean="0"/>
               <a:pPr/>
-              <a:t>2</a:t>
-            </a:fld>
-            <a:endParaRPr lang="en-US"/>
-          </a:p>
-        </p:txBody>
-      </p:sp>
-      <p:sp>
-        <p:nvSpPr>
-          <p:cNvPr id="5" name="Título 4">
-            <a:extLst>
-              <a:ext uri="{FF2B5EF4-FFF2-40B4-BE49-F238E27FC236}">
-                <a16:creationId xmlns:a16="http://schemas.microsoft.com/office/drawing/2014/main" id="{DAE9CA44-CC19-42CC-9694-3FEA44884815}"/>
-              </a:ext>
-            </a:extLst>
-          </p:cNvPr>
-          <p:cNvSpPr>
-            <a:spLocks noGrp="1"/>
-          </p:cNvSpPr>
-          <p:nvPr>
-            <p:ph type="title"/>
-          </p:nvPr>
-        </p:nvSpPr>
-        <p:spPr/>
-        <p:txBody>
-          <a:bodyPr/>
-          <a:lstStyle/>
-          <a:p>
-            <a:r>
-              <a:rPr lang="es-ES" dirty="0" err="1"/>
-              <a:t>Contents</a:t>
-            </a:r>
-            <a:endParaRPr lang="es-ES" dirty="0"/>
-          </a:p>
-        </p:txBody>
-      </p:sp>
-      <p:sp>
-        <p:nvSpPr>
-          <p:cNvPr id="9" name="Marcador de texto 2">
-            <a:extLst>
-              <a:ext uri="{FF2B5EF4-FFF2-40B4-BE49-F238E27FC236}">
-                <a16:creationId xmlns:a16="http://schemas.microsoft.com/office/drawing/2014/main" id="{61141410-43A0-370E-33AF-24055FCA329D}"/>
-              </a:ext>
-            </a:extLst>
-          </p:cNvPr>
-          <p:cNvSpPr txBox="1">
-            <a:spLocks/>
-          </p:cNvSpPr>
-          <p:nvPr/>
-        </p:nvSpPr>
-        <p:spPr>
-          <a:xfrm>
-            <a:off x="457200" y="1790700"/>
-            <a:ext cx="9742623" cy="4929566"/>
-          </a:xfrm>
-          <a:prstGeom prst="rect">
-            <a:avLst/>
-          </a:prstGeom>
-        </p:spPr>
-        <p:txBody>
-          <a:bodyPr>
-            <a:normAutofit/>
-          </a:bodyPr>
-          <a:lstStyle>
-            <a:lvl1pPr marL="457200" marR="0" indent="-457200" algn="l" defTabSz="457189" rtl="0" eaLnBrk="1" fontAlgn="auto" latinLnBrk="0" hangingPunct="1">
-              <a:lnSpc>
-                <a:spcPct val="100000"/>
-              </a:lnSpc>
-              <a:spcBef>
-                <a:spcPct val="20000"/>
-              </a:spcBef>
-              <a:spcAft>
-                <a:spcPts val="0"/>
-              </a:spcAft>
-              <a:buClr>
-                <a:srgbClr val="00A3AE"/>
-              </a:buClr>
-              <a:buSzTx/>
-              <a:buFont typeface="Arial" panose="020B0604020202020204" pitchFamily="34" charset="0"/>
-              <a:buChar char="•"/>
-              <a:tabLst/>
-              <a:defRPr lang="es-ES_tradnl" sz="2400" b="0" kern="1200" noProof="0" dirty="0" smtClean="0">
-                <a:solidFill>
-                  <a:srgbClr val="004851"/>
-                </a:solidFill>
-                <a:latin typeface="Arial" panose="020B0604020202020204" pitchFamily="34" charset="0"/>
-                <a:ea typeface="Arial" panose="020B0604020202020204" pitchFamily="34" charset="0"/>
-                <a:cs typeface="Arial" panose="020B0604020202020204" pitchFamily="34" charset="0"/>
-              </a:defRPr>
-            </a:lvl1pPr>
-            <a:lvl2pPr marL="742932" marR="0" indent="-285744" algn="l" defTabSz="457189" rtl="0" eaLnBrk="1" fontAlgn="auto" latinLnBrk="0" hangingPunct="1">
-              <a:lnSpc>
-                <a:spcPct val="100000"/>
-              </a:lnSpc>
-              <a:spcBef>
-                <a:spcPct val="20000"/>
-              </a:spcBef>
-              <a:spcAft>
-                <a:spcPts val="0"/>
-              </a:spcAft>
-              <a:buClr>
-                <a:srgbClr val="00A3AE"/>
-              </a:buClr>
-              <a:buSzTx/>
-              <a:buFont typeface="Arial" panose="020B0604020202020204" pitchFamily="34" charset="0"/>
-              <a:buChar char="•"/>
-              <a:tabLst/>
-              <a:defRPr lang="es-ES_tradnl" sz="2000" b="0" kern="1200" noProof="0" dirty="0" smtClean="0">
-                <a:solidFill>
-                  <a:srgbClr val="004851"/>
-                </a:solidFill>
-                <a:latin typeface="Arial" panose="020B0604020202020204" pitchFamily="34" charset="0"/>
-                <a:ea typeface="Arial" panose="020B0604020202020204" pitchFamily="34" charset="0"/>
-                <a:cs typeface="Arial" panose="020B0604020202020204" pitchFamily="34" charset="0"/>
-              </a:defRPr>
-            </a:lvl2pPr>
-            <a:lvl3pPr marL="1142971" marR="0" indent="-228594" algn="l" defTabSz="457189" rtl="0" eaLnBrk="1" fontAlgn="auto" latinLnBrk="0" hangingPunct="1">
-              <a:lnSpc>
-                <a:spcPct val="100000"/>
-              </a:lnSpc>
-              <a:spcBef>
-                <a:spcPct val="20000"/>
-              </a:spcBef>
-              <a:spcAft>
-                <a:spcPts val="0"/>
-              </a:spcAft>
-              <a:buClr>
-                <a:srgbClr val="00A3AE"/>
-              </a:buClr>
-              <a:buSzTx/>
-              <a:buFont typeface="Arial"/>
-              <a:buChar char="•"/>
-              <a:tabLst/>
-              <a:defRPr lang="es-ES_tradnl" sz="1800" kern="1200" noProof="0" dirty="0" smtClean="0">
-                <a:solidFill>
-                  <a:srgbClr val="004851"/>
-                </a:solidFill>
-                <a:latin typeface="Arial" panose="020B0604020202020204" pitchFamily="34" charset="0"/>
-                <a:ea typeface="Arial" panose="020B0604020202020204" pitchFamily="34" charset="0"/>
-                <a:cs typeface="Arial" panose="020B0604020202020204" pitchFamily="34" charset="0"/>
-              </a:defRPr>
-            </a:lvl3pPr>
-            <a:lvl4pPr marL="1600160" marR="0" indent="-228594" algn="l" defTabSz="457189" rtl="0" eaLnBrk="1" fontAlgn="auto" latinLnBrk="0" hangingPunct="1">
-              <a:lnSpc>
-                <a:spcPct val="100000"/>
-              </a:lnSpc>
-              <a:spcBef>
-                <a:spcPct val="20000"/>
-              </a:spcBef>
-              <a:spcAft>
-                <a:spcPts val="0"/>
-              </a:spcAft>
-              <a:buClr>
-                <a:srgbClr val="00A3AE"/>
-              </a:buClr>
-              <a:buSzTx/>
-              <a:buFont typeface="Arial"/>
-              <a:buChar char="–"/>
-              <a:tabLst/>
-              <a:defRPr lang="es-ES_tradnl" sz="1600" kern="1200" noProof="0" dirty="0" smtClean="0">
-                <a:solidFill>
-                  <a:srgbClr val="004851"/>
-                </a:solidFill>
-                <a:latin typeface="Arial" panose="020B0604020202020204" pitchFamily="34" charset="0"/>
-                <a:ea typeface="Arial" panose="020B0604020202020204" pitchFamily="34" charset="0"/>
-                <a:cs typeface="Arial" panose="020B0604020202020204" pitchFamily="34" charset="0"/>
-              </a:defRPr>
-            </a:lvl4pPr>
-            <a:lvl5pPr marL="2057349" marR="0" indent="-228594" algn="l" defTabSz="457189" rtl="0" eaLnBrk="1" fontAlgn="auto" latinLnBrk="0" hangingPunct="1">
-              <a:lnSpc>
-                <a:spcPct val="100000"/>
-              </a:lnSpc>
-              <a:spcBef>
-                <a:spcPct val="20000"/>
-              </a:spcBef>
-              <a:spcAft>
-                <a:spcPts val="0"/>
-              </a:spcAft>
-              <a:buClr>
-                <a:srgbClr val="00A3AE"/>
-              </a:buClr>
-              <a:buSzTx/>
-              <a:buFont typeface="AppleSymbols" panose="02000000000000000000" pitchFamily="2" charset="-79"/>
-              <a:buChar char="⎻"/>
-              <a:tabLst/>
-              <a:defRPr lang="en-US" sz="1600" b="0" kern="1200" noProof="0" dirty="0">
-                <a:solidFill>
-                  <a:srgbClr val="004851"/>
-                </a:solidFill>
-                <a:latin typeface="Arial" panose="020B0604020202020204" pitchFamily="34" charset="0"/>
-                <a:ea typeface="Arial" panose="020B0604020202020204" pitchFamily="34" charset="0"/>
-                <a:cs typeface="Arial" panose="020B0604020202020204" pitchFamily="34" charset="0"/>
-              </a:defRPr>
-            </a:lvl5pPr>
-            <a:lvl6pPr marL="2514600" indent="-228600" algn="l" defTabSz="457200" rtl="0" eaLnBrk="1" latinLnBrk="0" hangingPunct="1">
-              <a:spcBef>
-                <a:spcPct val="20000"/>
-              </a:spcBef>
-              <a:buFont typeface="Arial"/>
-              <a:buChar char="•"/>
-              <a:defRPr sz="200" kern="1200">
-                <a:solidFill>
-                  <a:schemeClr val="tx1"/>
-                </a:solidFill>
-                <a:latin typeface="+mn-lt"/>
-                <a:ea typeface="+mn-ea"/>
-                <a:cs typeface="+mn-cs"/>
-              </a:defRPr>
-            </a:lvl6pPr>
-            <a:lvl7pPr marL="2971800" indent="-228600" algn="l" defTabSz="457200" rtl="0" eaLnBrk="1" latinLnBrk="0" hangingPunct="1">
-              <a:spcBef>
-                <a:spcPct val="20000"/>
-              </a:spcBef>
-              <a:buFont typeface="Arial"/>
-              <a:buChar char="•"/>
-              <a:defRPr sz="3800" kern="1200">
-                <a:solidFill>
-                  <a:schemeClr val="tx1"/>
-                </a:solidFill>
-                <a:latin typeface="+mn-lt"/>
-                <a:ea typeface="+mn-ea"/>
-                <a:cs typeface="+mn-cs"/>
-              </a:defRPr>
-            </a:lvl7pPr>
-            <a:lvl8pPr marL="3429000" indent="-228600" algn="l" defTabSz="457200" rtl="0" eaLnBrk="1" latinLnBrk="0" hangingPunct="1">
-              <a:spcBef>
-                <a:spcPct val="20000"/>
-              </a:spcBef>
-              <a:buFont typeface="Arial"/>
-              <a:buChar char="•"/>
-              <a:defRPr sz="100" kern="1200">
-                <a:solidFill>
-                  <a:schemeClr val="tx1"/>
-                </a:solidFill>
-                <a:latin typeface="+mn-lt"/>
-                <a:ea typeface="+mn-ea"/>
-                <a:cs typeface="+mn-cs"/>
-              </a:defRPr>
-            </a:lvl8pPr>
-            <a:lvl9pPr marL="3886200" indent="-228600" algn="l" defTabSz="457200" rtl="0" eaLnBrk="1" latinLnBrk="0" hangingPunct="1">
-              <a:spcBef>
-                <a:spcPct val="20000"/>
-              </a:spcBef>
-              <a:buFont typeface="Arial"/>
-              <a:buChar char="•"/>
-              <a:defRPr sz="3300" kern="1200">
-                <a:solidFill>
-                  <a:schemeClr val="tx1"/>
-                </a:solidFill>
-                <a:latin typeface="+mn-lt"/>
-                <a:ea typeface="+mn-ea"/>
-                <a:cs typeface="+mn-cs"/>
-              </a:defRPr>
-            </a:lvl9pPr>
-          </a:lstStyle>
-          <a:p>
-            <a:pPr marL="605348">
-              <a:lnSpc>
-                <a:spcPct val="170000"/>
-              </a:lnSpc>
-              <a:buFont typeface="Arial"/>
-              <a:buAutoNum type="arabicPeriod"/>
-            </a:pPr>
-            <a:r>
-              <a:rPr lang="es-ES" sz="2000">
-                <a:latin typeface="Arial Nova Light" panose="020B0304020202020204" pitchFamily="34" charset="0"/>
-              </a:rPr>
-              <a:t>What </a:t>
-            </a:r>
-            <a:r>
-              <a:rPr lang="es-ES" sz="2000" dirty="0" err="1">
-                <a:latin typeface="Arial Nova Light" panose="020B0304020202020204" pitchFamily="34" charset="0"/>
-              </a:rPr>
-              <a:t>is</a:t>
-            </a:r>
-            <a:r>
-              <a:rPr lang="es-ES" sz="2000" dirty="0">
-                <a:latin typeface="Arial Nova Light" panose="020B0304020202020204" pitchFamily="34" charset="0"/>
-              </a:rPr>
-              <a:t> a </a:t>
-            </a:r>
-            <a:r>
-              <a:rPr lang="es-ES" sz="2000" dirty="0" err="1">
-                <a:latin typeface="Arial Nova Light" panose="020B0304020202020204" pitchFamily="34" charset="0"/>
-              </a:rPr>
-              <a:t>System</a:t>
-            </a:r>
-            <a:r>
-              <a:rPr lang="es-ES" sz="2000" dirty="0">
-                <a:latin typeface="Arial Nova Light" panose="020B0304020202020204" pitchFamily="34" charset="0"/>
-              </a:rPr>
-              <a:t> </a:t>
-            </a:r>
-            <a:r>
-              <a:rPr lang="es-ES" sz="2000" dirty="0" err="1">
-                <a:latin typeface="Arial Nova Light" panose="020B0304020202020204" pitchFamily="34" charset="0"/>
-              </a:rPr>
-              <a:t>Architecture</a:t>
-            </a:r>
-            <a:endParaRPr lang="es-ES" sz="2000" dirty="0">
-              <a:latin typeface="Arial Nova Light" panose="020B0304020202020204" pitchFamily="34" charset="0"/>
-            </a:endParaRPr>
-          </a:p>
-          <a:p>
-            <a:pPr marL="1100633" lvl="1" indent="-495285"/>
-            <a:r>
-              <a:rPr lang="es-ES" sz="1400">
-                <a:latin typeface="Arial Nova Light" panose="020B0304020202020204" pitchFamily="34" charset="0"/>
-              </a:rPr>
-              <a:t>Systems and Emergence</a:t>
-            </a:r>
-          </a:p>
-          <a:p>
-            <a:pPr marL="1100633" lvl="1" indent="-495285"/>
-            <a:r>
-              <a:rPr lang="es-ES" sz="1400">
-                <a:latin typeface="Arial Nova Light" panose="020B0304020202020204" pitchFamily="34" charset="0"/>
-              </a:rPr>
-              <a:t>Architecture and Views</a:t>
-            </a:r>
-          </a:p>
-          <a:p>
-            <a:pPr marL="605348">
-              <a:lnSpc>
-                <a:spcPct val="170000"/>
-              </a:lnSpc>
-              <a:buFont typeface="Arial"/>
-              <a:buAutoNum type="arabicPeriod"/>
-            </a:pPr>
-            <a:r>
-              <a:rPr lang="es-ES" sz="2000">
-                <a:latin typeface="Arial Nova Light" panose="020B0304020202020204" pitchFamily="34" charset="0"/>
-              </a:rPr>
-              <a:t>Analysis </a:t>
-            </a:r>
-            <a:r>
-              <a:rPr lang="es-ES" sz="2000" dirty="0" err="1">
-                <a:latin typeface="Arial Nova Light" panose="020B0304020202020204" pitchFamily="34" charset="0"/>
-              </a:rPr>
-              <a:t>of</a:t>
-            </a:r>
-            <a:r>
-              <a:rPr lang="es-ES" sz="2000" dirty="0">
-                <a:latin typeface="Arial Nova Light" panose="020B0304020202020204" pitchFamily="34" charset="0"/>
-              </a:rPr>
-              <a:t> </a:t>
-            </a:r>
-            <a:r>
-              <a:rPr lang="es-ES" sz="2000" dirty="0" err="1">
-                <a:latin typeface="Arial Nova Light" panose="020B0304020202020204" pitchFamily="34" charset="0"/>
-              </a:rPr>
-              <a:t>System</a:t>
-            </a:r>
-            <a:r>
-              <a:rPr lang="es-ES" sz="2000" dirty="0">
-                <a:latin typeface="Arial Nova Light" panose="020B0304020202020204" pitchFamily="34" charset="0"/>
-              </a:rPr>
-              <a:t> </a:t>
-            </a:r>
-            <a:r>
-              <a:rPr lang="es-ES" sz="2000" dirty="0" err="1">
-                <a:latin typeface="Arial Nova Light" panose="020B0304020202020204" pitchFamily="34" charset="0"/>
-              </a:rPr>
-              <a:t>Architecture</a:t>
-            </a:r>
-            <a:endParaRPr lang="es-ES" sz="2000" dirty="0">
-              <a:latin typeface="Arial Nova Light" panose="020B0304020202020204" pitchFamily="34" charset="0"/>
-            </a:endParaRPr>
-          </a:p>
-          <a:p>
-            <a:pPr marL="1100633" lvl="1" indent="-495285">
-              <a:lnSpc>
-                <a:spcPct val="110000"/>
-              </a:lnSpc>
-            </a:pPr>
-            <a:r>
-              <a:rPr lang="es-ES" sz="1400">
-                <a:latin typeface="Arial Nova Light" panose="020B0304020202020204" pitchFamily="34" charset="0"/>
-              </a:rPr>
-              <a:t>Form </a:t>
-            </a:r>
-            <a:r>
-              <a:rPr lang="es-ES" sz="1400" dirty="0">
-                <a:latin typeface="Arial Nova Light" panose="020B0304020202020204" pitchFamily="34" charset="0"/>
-              </a:rPr>
-              <a:t>and </a:t>
-            </a:r>
-            <a:r>
-              <a:rPr lang="es-ES" sz="1400" dirty="0" err="1">
-                <a:latin typeface="Arial Nova Light" panose="020B0304020202020204" pitchFamily="34" charset="0"/>
-              </a:rPr>
-              <a:t>Function</a:t>
-            </a:r>
-            <a:endParaRPr lang="es-ES" sz="1400" dirty="0">
-              <a:solidFill>
-                <a:srgbClr val="FF0000"/>
-              </a:solidFill>
-              <a:latin typeface="Arial Nova Light" panose="020B0304020202020204" pitchFamily="34" charset="0"/>
-            </a:endParaRPr>
-          </a:p>
-          <a:p>
-            <a:pPr marL="1100633" lvl="1" indent="-495285">
-              <a:lnSpc>
-                <a:spcPct val="110000"/>
-              </a:lnSpc>
-            </a:pPr>
-            <a:r>
-              <a:rPr lang="es-ES" sz="1400" err="1">
-                <a:latin typeface="Arial Nova Light" panose="020B0304020202020204" pitchFamily="34" charset="0"/>
-              </a:rPr>
-              <a:t>Structural</a:t>
-            </a:r>
-            <a:r>
-              <a:rPr lang="es-ES" sz="1400">
-                <a:latin typeface="Arial Nova Light" panose="020B0304020202020204" pitchFamily="34" charset="0"/>
-              </a:rPr>
-              <a:t> Decomposition and Functional </a:t>
-            </a:r>
-            <a:r>
-              <a:rPr lang="es-ES" sz="1400" dirty="0" err="1">
-                <a:latin typeface="Arial Nova Light" panose="020B0304020202020204" pitchFamily="34" charset="0"/>
-              </a:rPr>
-              <a:t>Decomposition</a:t>
-            </a:r>
-            <a:endParaRPr lang="es-ES" sz="1400" dirty="0">
-              <a:latin typeface="Arial Nova Light" panose="020B0304020202020204" pitchFamily="34" charset="0"/>
-            </a:endParaRPr>
-          </a:p>
-          <a:p>
-            <a:pPr marL="1100633" lvl="1" indent="-495285">
-              <a:lnSpc>
-                <a:spcPct val="110000"/>
-              </a:lnSpc>
-            </a:pPr>
-            <a:r>
-              <a:rPr lang="es-ES" sz="1400">
-                <a:latin typeface="Arial Nova Light" panose="020B0304020202020204" pitchFamily="34" charset="0"/>
-              </a:rPr>
-              <a:t>View types</a:t>
-            </a:r>
-          </a:p>
-          <a:p>
-            <a:pPr marL="148148" indent="0">
-              <a:lnSpc>
-                <a:spcPct val="170000"/>
-              </a:lnSpc>
-              <a:buNone/>
-            </a:pPr>
-            <a:endParaRPr lang="es-ES" sz="2000" dirty="0">
-              <a:latin typeface="Arial Nova Light" panose="020B0304020202020204" pitchFamily="34" charset="0"/>
-            </a:endParaRPr>
-          </a:p>
-          <a:p>
-            <a:pPr marL="605348">
-              <a:lnSpc>
-                <a:spcPct val="170000"/>
-              </a:lnSpc>
-              <a:buFont typeface="Arial"/>
-              <a:buAutoNum type="arabicPeriod"/>
-            </a:pPr>
-            <a:endParaRPr lang="es-ES" sz="2000" dirty="0">
-              <a:latin typeface="Arial Nova Light" panose="020B0304020202020204" pitchFamily="34" charset="0"/>
-            </a:endParaRPr>
-          </a:p>
-          <a:p>
-            <a:pPr marL="605348">
-              <a:lnSpc>
-                <a:spcPct val="170000"/>
-              </a:lnSpc>
-              <a:buFont typeface="+mj-lt"/>
-              <a:buAutoNum type="arabicPeriod" startAt="5"/>
-            </a:pPr>
-            <a:endParaRPr lang="es-ES" sz="2000" dirty="0">
-              <a:latin typeface="Arial Nova Light" panose="020B0304020202020204" pitchFamily="34" charset="0"/>
-            </a:endParaRPr>
-          </a:p>
-        </p:txBody>
-      </p:sp>
-    </p:spTree>
-    <p:extLst>
-      <p:ext uri="{BB962C8B-B14F-4D97-AF65-F5344CB8AC3E}">
-        <p14:creationId xmlns:p14="http://schemas.microsoft.com/office/powerpoint/2010/main" val="537333452"/>
-      </p:ext>
-    </p:extLst>
-  </p:cSld>
-  <p:clrMapOvr>
-    <a:masterClrMapping/>
-  </p:clrMapOvr>
-</p:sld>
-</file>
-
-<file path=ppt/slides/slide20.xml><?xml version="1.0" encoding="utf-8"?>
-<p:sld xmlns:a="http://schemas.openxmlformats.org/drawingml/2006/main" xmlns:r="http://schemas.openxmlformats.org/officeDocument/2006/relationships" xmlns:p="http://schemas.openxmlformats.org/presentationml/2006/main">
-  <p:cSld>
-    <p:spTree>
-      <p:nvGrpSpPr>
-        <p:cNvPr id="1" name=""/>
-        <p:cNvGrpSpPr/>
-        <p:nvPr/>
-      </p:nvGrpSpPr>
-      <p:grpSpPr>
-        <a:xfrm>
-          <a:off x="0" y="0"/>
-          <a:ext cx="0" cy="0"/>
-          <a:chOff x="0" y="0"/>
-          <a:chExt cx="0" cy="0"/>
-        </a:xfrm>
-      </p:grpSpPr>
-      <p:sp>
-        <p:nvSpPr>
-          <p:cNvPr id="2" name="Marcador de fecha 1">
-            <a:extLst>
-              <a:ext uri="{FF2B5EF4-FFF2-40B4-BE49-F238E27FC236}">
-                <a16:creationId xmlns:a16="http://schemas.microsoft.com/office/drawing/2014/main" id="{2C8D63E8-D259-E69F-184D-44D4CD17D6AA}"/>
-              </a:ext>
-            </a:extLst>
-          </p:cNvPr>
-          <p:cNvSpPr>
-            <a:spLocks noGrp="1"/>
-          </p:cNvSpPr>
-          <p:nvPr>
-            <p:ph type="dt" sz="half" idx="10"/>
-          </p:nvPr>
-        </p:nvSpPr>
-        <p:spPr/>
-        <p:txBody>
-          <a:bodyPr/>
-          <a:lstStyle/>
-          <a:p>
-            <a:r>
-              <a:rPr lang="es-ES"/>
-              <a:t>MSIE 2022-2023</a:t>
-            </a:r>
-            <a:endParaRPr lang="en-US" dirty="0"/>
-          </a:p>
-        </p:txBody>
-      </p:sp>
-      <p:sp>
-        <p:nvSpPr>
-          <p:cNvPr id="3" name="Marcador de pie de página 2">
-            <a:extLst>
-              <a:ext uri="{FF2B5EF4-FFF2-40B4-BE49-F238E27FC236}">
-                <a16:creationId xmlns:a16="http://schemas.microsoft.com/office/drawing/2014/main" id="{046334FD-D8CB-83CE-B06B-B6FB2CA703F6}"/>
-              </a:ext>
-            </a:extLst>
-          </p:cNvPr>
-          <p:cNvSpPr>
-            <a:spLocks noGrp="1"/>
-          </p:cNvSpPr>
-          <p:nvPr>
-            <p:ph type="ftr" sz="quarter" idx="11"/>
-          </p:nvPr>
-        </p:nvSpPr>
-        <p:spPr/>
-        <p:txBody>
-          <a:bodyPr/>
-          <a:lstStyle/>
-          <a:p>
-            <a:r>
-              <a:rPr lang="en-US"/>
-              <a:t>Testing and validation platforms - Architecture </a:t>
-            </a:r>
-            <a:endParaRPr lang="en-US" dirty="0"/>
-          </a:p>
-        </p:txBody>
-      </p:sp>
-      <p:sp>
-        <p:nvSpPr>
-          <p:cNvPr id="4" name="Marcador de número de diapositiva 3">
-            <a:extLst>
-              <a:ext uri="{FF2B5EF4-FFF2-40B4-BE49-F238E27FC236}">
-                <a16:creationId xmlns:a16="http://schemas.microsoft.com/office/drawing/2014/main" id="{F09EA907-5B8E-39B7-3DAE-9267CEA28EDE}"/>
-              </a:ext>
-            </a:extLst>
-          </p:cNvPr>
-          <p:cNvSpPr>
-            <a:spLocks noGrp="1"/>
-          </p:cNvSpPr>
-          <p:nvPr>
-            <p:ph type="sldNum" sz="quarter" idx="12"/>
-          </p:nvPr>
-        </p:nvSpPr>
-        <p:spPr/>
-        <p:txBody>
-          <a:bodyPr/>
-          <a:lstStyle/>
-          <a:p>
-            <a:fld id="{F7356FEA-1119-414E-9BDA-0F3F06B9EA58}" type="slidenum">
-              <a:rPr lang="en-US" smtClean="0"/>
-              <a:pPr/>
-              <a:t>20</a:t>
+              <a:t>19</a:t>
             </a:fld>
             <a:endParaRPr lang="en-US"/>
           </a:p>
@@ -10118,7 +9328,7 @@
 </p:sld>
 </file>
 
-<file path=ppt/slides/slide21.xml><?xml version="1.0" encoding="utf-8"?>
+<file path=ppt/slides/slide2.xml><?xml version="1.0" encoding="utf-8"?>
 <p:sld xmlns:a="http://schemas.openxmlformats.org/drawingml/2006/main" xmlns:r="http://schemas.openxmlformats.org/officeDocument/2006/relationships" xmlns:p="http://schemas.openxmlformats.org/presentationml/2006/main">
   <p:cSld>
     <p:spTree>
@@ -10140,7 +9350,7 @@
           <p:cNvPr id="2" name="Marcador de fecha 1">
             <a:extLst>
               <a:ext uri="{FF2B5EF4-FFF2-40B4-BE49-F238E27FC236}">
-                <a16:creationId xmlns:a16="http://schemas.microsoft.com/office/drawing/2014/main" id="{2C8D63E8-D259-E69F-184D-44D4CD17D6AA}"/>
+                <a16:creationId xmlns:a16="http://schemas.microsoft.com/office/drawing/2014/main" id="{38559273-7AB1-4A95-985D-22564E7DD5B1}"/>
               </a:ext>
             </a:extLst>
           </p:cNvPr>
@@ -10169,7 +9379,7 @@
           <p:cNvPr id="3" name="Marcador de pie de página 2">
             <a:extLst>
               <a:ext uri="{FF2B5EF4-FFF2-40B4-BE49-F238E27FC236}">
-                <a16:creationId xmlns:a16="http://schemas.microsoft.com/office/drawing/2014/main" id="{046334FD-D8CB-83CE-B06B-B6FB2CA703F6}"/>
+                <a16:creationId xmlns:a16="http://schemas.microsoft.com/office/drawing/2014/main" id="{45A5B9AB-2304-4735-B1EC-EE23ACF69CEE}"/>
               </a:ext>
             </a:extLst>
           </p:cNvPr>
@@ -10198,7 +9408,7 @@
           <p:cNvPr id="4" name="Marcador de número de diapositiva 3">
             <a:extLst>
               <a:ext uri="{FF2B5EF4-FFF2-40B4-BE49-F238E27FC236}">
-                <a16:creationId xmlns:a16="http://schemas.microsoft.com/office/drawing/2014/main" id="{F09EA907-5B8E-39B7-3DAE-9267CEA28EDE}"/>
+                <a16:creationId xmlns:a16="http://schemas.microsoft.com/office/drawing/2014/main" id="{A87072F7-DE8E-43BB-B3B5-FE1120EAF2FA}"/>
               </a:ext>
             </a:extLst>
           </p:cNvPr>
@@ -10217,7 +9427,596 @@
             <a:fld id="{F7356FEA-1119-414E-9BDA-0F3F06B9EA58}" type="slidenum">
               <a:rPr lang="en-US" smtClean="0"/>
               <a:pPr/>
-              <a:t>21</a:t>
+              <a:t>2</a:t>
+            </a:fld>
+            <a:endParaRPr lang="en-US"/>
+          </a:p>
+        </p:txBody>
+      </p:sp>
+      <p:sp>
+        <p:nvSpPr>
+          <p:cNvPr id="5" name="Título 4">
+            <a:extLst>
+              <a:ext uri="{FF2B5EF4-FFF2-40B4-BE49-F238E27FC236}">
+                <a16:creationId xmlns:a16="http://schemas.microsoft.com/office/drawing/2014/main" id="{DAE9CA44-CC19-42CC-9694-3FEA44884815}"/>
+              </a:ext>
+            </a:extLst>
+          </p:cNvPr>
+          <p:cNvSpPr>
+            <a:spLocks noGrp="1"/>
+          </p:cNvSpPr>
+          <p:nvPr>
+            <p:ph type="title"/>
+          </p:nvPr>
+        </p:nvSpPr>
+        <p:spPr/>
+        <p:txBody>
+          <a:bodyPr/>
+          <a:lstStyle/>
+          <a:p>
+            <a:r>
+              <a:rPr lang="es-ES" dirty="0" err="1"/>
+              <a:t>Contents</a:t>
+            </a:r>
+            <a:endParaRPr lang="es-ES" dirty="0"/>
+          </a:p>
+        </p:txBody>
+      </p:sp>
+      <p:sp>
+        <p:nvSpPr>
+          <p:cNvPr id="9" name="Marcador de texto 2">
+            <a:extLst>
+              <a:ext uri="{FF2B5EF4-FFF2-40B4-BE49-F238E27FC236}">
+                <a16:creationId xmlns:a16="http://schemas.microsoft.com/office/drawing/2014/main" id="{61141410-43A0-370E-33AF-24055FCA329D}"/>
+              </a:ext>
+            </a:extLst>
+          </p:cNvPr>
+          <p:cNvSpPr txBox="1">
+            <a:spLocks/>
+          </p:cNvSpPr>
+          <p:nvPr/>
+        </p:nvSpPr>
+        <p:spPr>
+          <a:xfrm>
+            <a:off x="457200" y="1790700"/>
+            <a:ext cx="9742623" cy="4929566"/>
+          </a:xfrm>
+          <a:prstGeom prst="rect">
+            <a:avLst/>
+          </a:prstGeom>
+        </p:spPr>
+        <p:txBody>
+          <a:bodyPr>
+            <a:normAutofit/>
+          </a:bodyPr>
+          <a:lstStyle>
+            <a:lvl1pPr marL="457200" marR="0" indent="-457200" algn="l" defTabSz="457189" rtl="0" eaLnBrk="1" fontAlgn="auto" latinLnBrk="0" hangingPunct="1">
+              <a:lnSpc>
+                <a:spcPct val="100000"/>
+              </a:lnSpc>
+              <a:spcBef>
+                <a:spcPct val="20000"/>
+              </a:spcBef>
+              <a:spcAft>
+                <a:spcPts val="0"/>
+              </a:spcAft>
+              <a:buClr>
+                <a:srgbClr val="00A3AE"/>
+              </a:buClr>
+              <a:buSzTx/>
+              <a:buFont typeface="Arial" panose="020B0604020202020204" pitchFamily="34" charset="0"/>
+              <a:buChar char="•"/>
+              <a:tabLst/>
+              <a:defRPr lang="es-ES_tradnl" sz="2400" b="0" kern="1200" noProof="0" dirty="0" smtClean="0">
+                <a:solidFill>
+                  <a:srgbClr val="004851"/>
+                </a:solidFill>
+                <a:latin typeface="Arial" panose="020B0604020202020204" pitchFamily="34" charset="0"/>
+                <a:ea typeface="Arial" panose="020B0604020202020204" pitchFamily="34" charset="0"/>
+                <a:cs typeface="Arial" panose="020B0604020202020204" pitchFamily="34" charset="0"/>
+              </a:defRPr>
+            </a:lvl1pPr>
+            <a:lvl2pPr marL="742932" marR="0" indent="-285744" algn="l" defTabSz="457189" rtl="0" eaLnBrk="1" fontAlgn="auto" latinLnBrk="0" hangingPunct="1">
+              <a:lnSpc>
+                <a:spcPct val="100000"/>
+              </a:lnSpc>
+              <a:spcBef>
+                <a:spcPct val="20000"/>
+              </a:spcBef>
+              <a:spcAft>
+                <a:spcPts val="0"/>
+              </a:spcAft>
+              <a:buClr>
+                <a:srgbClr val="00A3AE"/>
+              </a:buClr>
+              <a:buSzTx/>
+              <a:buFont typeface="Arial" panose="020B0604020202020204" pitchFamily="34" charset="0"/>
+              <a:buChar char="•"/>
+              <a:tabLst/>
+              <a:defRPr lang="es-ES_tradnl" sz="2000" b="0" kern="1200" noProof="0" dirty="0" smtClean="0">
+                <a:solidFill>
+                  <a:srgbClr val="004851"/>
+                </a:solidFill>
+                <a:latin typeface="Arial" panose="020B0604020202020204" pitchFamily="34" charset="0"/>
+                <a:ea typeface="Arial" panose="020B0604020202020204" pitchFamily="34" charset="0"/>
+                <a:cs typeface="Arial" panose="020B0604020202020204" pitchFamily="34" charset="0"/>
+              </a:defRPr>
+            </a:lvl2pPr>
+            <a:lvl3pPr marL="1142971" marR="0" indent="-228594" algn="l" defTabSz="457189" rtl="0" eaLnBrk="1" fontAlgn="auto" latinLnBrk="0" hangingPunct="1">
+              <a:lnSpc>
+                <a:spcPct val="100000"/>
+              </a:lnSpc>
+              <a:spcBef>
+                <a:spcPct val="20000"/>
+              </a:spcBef>
+              <a:spcAft>
+                <a:spcPts val="0"/>
+              </a:spcAft>
+              <a:buClr>
+                <a:srgbClr val="00A3AE"/>
+              </a:buClr>
+              <a:buSzTx/>
+              <a:buFont typeface="Arial"/>
+              <a:buChar char="•"/>
+              <a:tabLst/>
+              <a:defRPr lang="es-ES_tradnl" sz="1800" kern="1200" noProof="0" dirty="0" smtClean="0">
+                <a:solidFill>
+                  <a:srgbClr val="004851"/>
+                </a:solidFill>
+                <a:latin typeface="Arial" panose="020B0604020202020204" pitchFamily="34" charset="0"/>
+                <a:ea typeface="Arial" panose="020B0604020202020204" pitchFamily="34" charset="0"/>
+                <a:cs typeface="Arial" panose="020B0604020202020204" pitchFamily="34" charset="0"/>
+              </a:defRPr>
+            </a:lvl3pPr>
+            <a:lvl4pPr marL="1600160" marR="0" indent="-228594" algn="l" defTabSz="457189" rtl="0" eaLnBrk="1" fontAlgn="auto" latinLnBrk="0" hangingPunct="1">
+              <a:lnSpc>
+                <a:spcPct val="100000"/>
+              </a:lnSpc>
+              <a:spcBef>
+                <a:spcPct val="20000"/>
+              </a:spcBef>
+              <a:spcAft>
+                <a:spcPts val="0"/>
+              </a:spcAft>
+              <a:buClr>
+                <a:srgbClr val="00A3AE"/>
+              </a:buClr>
+              <a:buSzTx/>
+              <a:buFont typeface="Arial"/>
+              <a:buChar char="–"/>
+              <a:tabLst/>
+              <a:defRPr lang="es-ES_tradnl" sz="1600" kern="1200" noProof="0" dirty="0" smtClean="0">
+                <a:solidFill>
+                  <a:srgbClr val="004851"/>
+                </a:solidFill>
+                <a:latin typeface="Arial" panose="020B0604020202020204" pitchFamily="34" charset="0"/>
+                <a:ea typeface="Arial" panose="020B0604020202020204" pitchFamily="34" charset="0"/>
+                <a:cs typeface="Arial" panose="020B0604020202020204" pitchFamily="34" charset="0"/>
+              </a:defRPr>
+            </a:lvl4pPr>
+            <a:lvl5pPr marL="2057349" marR="0" indent="-228594" algn="l" defTabSz="457189" rtl="0" eaLnBrk="1" fontAlgn="auto" latinLnBrk="0" hangingPunct="1">
+              <a:lnSpc>
+                <a:spcPct val="100000"/>
+              </a:lnSpc>
+              <a:spcBef>
+                <a:spcPct val="20000"/>
+              </a:spcBef>
+              <a:spcAft>
+                <a:spcPts val="0"/>
+              </a:spcAft>
+              <a:buClr>
+                <a:srgbClr val="00A3AE"/>
+              </a:buClr>
+              <a:buSzTx/>
+              <a:buFont typeface="AppleSymbols" panose="02000000000000000000" pitchFamily="2" charset="-79"/>
+              <a:buChar char="⎻"/>
+              <a:tabLst/>
+              <a:defRPr lang="en-US" sz="1600" b="0" kern="1200" noProof="0" dirty="0">
+                <a:solidFill>
+                  <a:srgbClr val="004851"/>
+                </a:solidFill>
+                <a:latin typeface="Arial" panose="020B0604020202020204" pitchFamily="34" charset="0"/>
+                <a:ea typeface="Arial" panose="020B0604020202020204" pitchFamily="34" charset="0"/>
+                <a:cs typeface="Arial" panose="020B0604020202020204" pitchFamily="34" charset="0"/>
+              </a:defRPr>
+            </a:lvl5pPr>
+            <a:lvl6pPr marL="2514600" indent="-228600" algn="l" defTabSz="457200" rtl="0" eaLnBrk="1" latinLnBrk="0" hangingPunct="1">
+              <a:spcBef>
+                <a:spcPct val="20000"/>
+              </a:spcBef>
+              <a:buFont typeface="Arial"/>
+              <a:buChar char="•"/>
+              <a:defRPr sz="200" kern="1200">
+                <a:solidFill>
+                  <a:schemeClr val="tx1"/>
+                </a:solidFill>
+                <a:latin typeface="+mn-lt"/>
+                <a:ea typeface="+mn-ea"/>
+                <a:cs typeface="+mn-cs"/>
+              </a:defRPr>
+            </a:lvl6pPr>
+            <a:lvl7pPr marL="2971800" indent="-228600" algn="l" defTabSz="457200" rtl="0" eaLnBrk="1" latinLnBrk="0" hangingPunct="1">
+              <a:spcBef>
+                <a:spcPct val="20000"/>
+              </a:spcBef>
+              <a:buFont typeface="Arial"/>
+              <a:buChar char="•"/>
+              <a:defRPr sz="3800" kern="1200">
+                <a:solidFill>
+                  <a:schemeClr val="tx1"/>
+                </a:solidFill>
+                <a:latin typeface="+mn-lt"/>
+                <a:ea typeface="+mn-ea"/>
+                <a:cs typeface="+mn-cs"/>
+              </a:defRPr>
+            </a:lvl7pPr>
+            <a:lvl8pPr marL="3429000" indent="-228600" algn="l" defTabSz="457200" rtl="0" eaLnBrk="1" latinLnBrk="0" hangingPunct="1">
+              <a:spcBef>
+                <a:spcPct val="20000"/>
+              </a:spcBef>
+              <a:buFont typeface="Arial"/>
+              <a:buChar char="•"/>
+              <a:defRPr sz="100" kern="1200">
+                <a:solidFill>
+                  <a:schemeClr val="tx1"/>
+                </a:solidFill>
+                <a:latin typeface="+mn-lt"/>
+                <a:ea typeface="+mn-ea"/>
+                <a:cs typeface="+mn-cs"/>
+              </a:defRPr>
+            </a:lvl8pPr>
+            <a:lvl9pPr marL="3886200" indent="-228600" algn="l" defTabSz="457200" rtl="0" eaLnBrk="1" latinLnBrk="0" hangingPunct="1">
+              <a:spcBef>
+                <a:spcPct val="20000"/>
+              </a:spcBef>
+              <a:buFont typeface="Arial"/>
+              <a:buChar char="•"/>
+              <a:defRPr sz="3300" kern="1200">
+                <a:solidFill>
+                  <a:schemeClr val="tx1"/>
+                </a:solidFill>
+                <a:latin typeface="+mn-lt"/>
+                <a:ea typeface="+mn-ea"/>
+                <a:cs typeface="+mn-cs"/>
+              </a:defRPr>
+            </a:lvl9pPr>
+          </a:lstStyle>
+          <a:p>
+            <a:pPr marL="605348">
+              <a:lnSpc>
+                <a:spcPct val="170000"/>
+              </a:lnSpc>
+              <a:buFont typeface="Arial"/>
+              <a:buAutoNum type="arabicPeriod"/>
+            </a:pPr>
+            <a:r>
+              <a:rPr lang="es-ES" sz="2000">
+                <a:latin typeface="Arial Nova Light" panose="020B0304020202020204" pitchFamily="34" charset="0"/>
+              </a:rPr>
+              <a:t>What </a:t>
+            </a:r>
+            <a:r>
+              <a:rPr lang="es-ES" sz="2000" dirty="0" err="1">
+                <a:latin typeface="Arial Nova Light" panose="020B0304020202020204" pitchFamily="34" charset="0"/>
+              </a:rPr>
+              <a:t>is</a:t>
+            </a:r>
+            <a:r>
+              <a:rPr lang="es-ES" sz="2000" dirty="0">
+                <a:latin typeface="Arial Nova Light" panose="020B0304020202020204" pitchFamily="34" charset="0"/>
+              </a:rPr>
+              <a:t> a </a:t>
+            </a:r>
+            <a:r>
+              <a:rPr lang="es-ES" sz="2000" dirty="0" err="1">
+                <a:latin typeface="Arial Nova Light" panose="020B0304020202020204" pitchFamily="34" charset="0"/>
+              </a:rPr>
+              <a:t>System</a:t>
+            </a:r>
+            <a:r>
+              <a:rPr lang="es-ES" sz="2000" dirty="0">
+                <a:latin typeface="Arial Nova Light" panose="020B0304020202020204" pitchFamily="34" charset="0"/>
+              </a:rPr>
+              <a:t> </a:t>
+            </a:r>
+            <a:r>
+              <a:rPr lang="es-ES" sz="2000" dirty="0" err="1">
+                <a:latin typeface="Arial Nova Light" panose="020B0304020202020204" pitchFamily="34" charset="0"/>
+              </a:rPr>
+              <a:t>Architecture</a:t>
+            </a:r>
+            <a:endParaRPr lang="es-ES" sz="2000" dirty="0">
+              <a:latin typeface="Arial Nova Light" panose="020B0304020202020204" pitchFamily="34" charset="0"/>
+            </a:endParaRPr>
+          </a:p>
+          <a:p>
+            <a:pPr marL="1100633" lvl="1" indent="-495285"/>
+            <a:r>
+              <a:rPr lang="es-ES" sz="1400">
+                <a:latin typeface="Arial Nova Light" panose="020B0304020202020204" pitchFamily="34" charset="0"/>
+              </a:rPr>
+              <a:t>Systems and Emergence</a:t>
+            </a:r>
+          </a:p>
+          <a:p>
+            <a:pPr marL="1100633" lvl="1" indent="-495285"/>
+            <a:r>
+              <a:rPr lang="es-ES" sz="1400">
+                <a:latin typeface="Arial Nova Light" panose="020B0304020202020204" pitchFamily="34" charset="0"/>
+              </a:rPr>
+              <a:t>Architecture and Views</a:t>
+            </a:r>
+          </a:p>
+          <a:p>
+            <a:pPr marL="605348">
+              <a:lnSpc>
+                <a:spcPct val="170000"/>
+              </a:lnSpc>
+              <a:buFont typeface="Arial"/>
+              <a:buAutoNum type="arabicPeriod"/>
+            </a:pPr>
+            <a:r>
+              <a:rPr lang="es-ES" sz="2000">
+                <a:latin typeface="Arial Nova Light" panose="020B0304020202020204" pitchFamily="34" charset="0"/>
+              </a:rPr>
+              <a:t>Analysis </a:t>
+            </a:r>
+            <a:r>
+              <a:rPr lang="es-ES" sz="2000" dirty="0" err="1">
+                <a:latin typeface="Arial Nova Light" panose="020B0304020202020204" pitchFamily="34" charset="0"/>
+              </a:rPr>
+              <a:t>of</a:t>
+            </a:r>
+            <a:r>
+              <a:rPr lang="es-ES" sz="2000" dirty="0">
+                <a:latin typeface="Arial Nova Light" panose="020B0304020202020204" pitchFamily="34" charset="0"/>
+              </a:rPr>
+              <a:t> </a:t>
+            </a:r>
+            <a:r>
+              <a:rPr lang="es-ES" sz="2000" dirty="0" err="1">
+                <a:latin typeface="Arial Nova Light" panose="020B0304020202020204" pitchFamily="34" charset="0"/>
+              </a:rPr>
+              <a:t>System</a:t>
+            </a:r>
+            <a:r>
+              <a:rPr lang="es-ES" sz="2000" dirty="0">
+                <a:latin typeface="Arial Nova Light" panose="020B0304020202020204" pitchFamily="34" charset="0"/>
+              </a:rPr>
+              <a:t> </a:t>
+            </a:r>
+            <a:r>
+              <a:rPr lang="es-ES" sz="2000" dirty="0" err="1">
+                <a:latin typeface="Arial Nova Light" panose="020B0304020202020204" pitchFamily="34" charset="0"/>
+              </a:rPr>
+              <a:t>Architecture</a:t>
+            </a:r>
+            <a:endParaRPr lang="es-ES" sz="2000" dirty="0">
+              <a:latin typeface="Arial Nova Light" panose="020B0304020202020204" pitchFamily="34" charset="0"/>
+            </a:endParaRPr>
+          </a:p>
+          <a:p>
+            <a:pPr marL="1100633" lvl="1" indent="-495285">
+              <a:lnSpc>
+                <a:spcPct val="110000"/>
+              </a:lnSpc>
+            </a:pPr>
+            <a:r>
+              <a:rPr lang="es-ES" sz="1400">
+                <a:latin typeface="Arial Nova Light" panose="020B0304020202020204" pitchFamily="34" charset="0"/>
+              </a:rPr>
+              <a:t>Form </a:t>
+            </a:r>
+            <a:r>
+              <a:rPr lang="es-ES" sz="1400" dirty="0">
+                <a:latin typeface="Arial Nova Light" panose="020B0304020202020204" pitchFamily="34" charset="0"/>
+              </a:rPr>
+              <a:t>and </a:t>
+            </a:r>
+            <a:r>
+              <a:rPr lang="es-ES" sz="1400" dirty="0" err="1">
+                <a:latin typeface="Arial Nova Light" panose="020B0304020202020204" pitchFamily="34" charset="0"/>
+              </a:rPr>
+              <a:t>Function</a:t>
+            </a:r>
+            <a:endParaRPr lang="es-ES" sz="1400" dirty="0">
+              <a:solidFill>
+                <a:srgbClr val="FF0000"/>
+              </a:solidFill>
+              <a:latin typeface="Arial Nova Light" panose="020B0304020202020204" pitchFamily="34" charset="0"/>
+            </a:endParaRPr>
+          </a:p>
+          <a:p>
+            <a:pPr marL="1100633" lvl="1" indent="-495285">
+              <a:lnSpc>
+                <a:spcPct val="110000"/>
+              </a:lnSpc>
+            </a:pPr>
+            <a:r>
+              <a:rPr lang="es-ES" sz="1400" err="1">
+                <a:latin typeface="Arial Nova Light" panose="020B0304020202020204" pitchFamily="34" charset="0"/>
+              </a:rPr>
+              <a:t>Structural</a:t>
+            </a:r>
+            <a:r>
+              <a:rPr lang="es-ES" sz="1400">
+                <a:latin typeface="Arial Nova Light" panose="020B0304020202020204" pitchFamily="34" charset="0"/>
+              </a:rPr>
+              <a:t> Decomposition and Functional </a:t>
+            </a:r>
+            <a:r>
+              <a:rPr lang="es-ES" sz="1400" dirty="0" err="1">
+                <a:latin typeface="Arial Nova Light" panose="020B0304020202020204" pitchFamily="34" charset="0"/>
+              </a:rPr>
+              <a:t>Decomposition</a:t>
+            </a:r>
+            <a:endParaRPr lang="es-ES" sz="1400" dirty="0">
+              <a:latin typeface="Arial Nova Light" panose="020B0304020202020204" pitchFamily="34" charset="0"/>
+            </a:endParaRPr>
+          </a:p>
+          <a:p>
+            <a:pPr marL="1100633" lvl="1" indent="-495285">
+              <a:lnSpc>
+                <a:spcPct val="110000"/>
+              </a:lnSpc>
+            </a:pPr>
+            <a:r>
+              <a:rPr lang="es-ES" sz="1400">
+                <a:latin typeface="Arial Nova Light" panose="020B0304020202020204" pitchFamily="34" charset="0"/>
+              </a:rPr>
+              <a:t>View types</a:t>
+            </a:r>
+          </a:p>
+          <a:p>
+            <a:pPr marL="148148" indent="0">
+              <a:lnSpc>
+                <a:spcPct val="170000"/>
+              </a:lnSpc>
+              <a:buNone/>
+            </a:pPr>
+            <a:endParaRPr lang="es-ES" sz="2000" dirty="0">
+              <a:latin typeface="Arial Nova Light" panose="020B0304020202020204" pitchFamily="34" charset="0"/>
+            </a:endParaRPr>
+          </a:p>
+          <a:p>
+            <a:pPr marL="605348">
+              <a:lnSpc>
+                <a:spcPct val="170000"/>
+              </a:lnSpc>
+              <a:buFont typeface="Arial"/>
+              <a:buAutoNum type="arabicPeriod"/>
+            </a:pPr>
+            <a:endParaRPr lang="es-ES" sz="2000" dirty="0">
+              <a:latin typeface="Arial Nova Light" panose="020B0304020202020204" pitchFamily="34" charset="0"/>
+            </a:endParaRPr>
+          </a:p>
+          <a:p>
+            <a:pPr marL="605348">
+              <a:lnSpc>
+                <a:spcPct val="170000"/>
+              </a:lnSpc>
+              <a:buFont typeface="+mj-lt"/>
+              <a:buAutoNum type="arabicPeriod" startAt="5"/>
+            </a:pPr>
+            <a:endParaRPr lang="es-ES" sz="2000" dirty="0">
+              <a:latin typeface="Arial Nova Light" panose="020B0304020202020204" pitchFamily="34" charset="0"/>
+            </a:endParaRPr>
+          </a:p>
+        </p:txBody>
+      </p:sp>
+    </p:spTree>
+    <p:extLst>
+      <p:ext uri="{BB962C8B-B14F-4D97-AF65-F5344CB8AC3E}">
+        <p14:creationId xmlns:p14="http://schemas.microsoft.com/office/powerpoint/2010/main" val="537333452"/>
+      </p:ext>
+    </p:extLst>
+  </p:cSld>
+  <p:clrMapOvr>
+    <a:masterClrMapping/>
+  </p:clrMapOvr>
+</p:sld>
+</file>
+
+<file path=ppt/slides/slide20.xml><?xml version="1.0" encoding="utf-8"?>
+<p:sld xmlns:a="http://schemas.openxmlformats.org/drawingml/2006/main" xmlns:r="http://schemas.openxmlformats.org/officeDocument/2006/relationships" xmlns:p="http://schemas.openxmlformats.org/presentationml/2006/main">
+  <p:cSld>
+    <p:spTree>
+      <p:nvGrpSpPr>
+        <p:cNvPr id="1" name=""/>
+        <p:cNvGrpSpPr/>
+        <p:nvPr/>
+      </p:nvGrpSpPr>
+      <p:grpSpPr>
+        <a:xfrm>
+          <a:off x="0" y="0"/>
+          <a:ext cx="0" cy="0"/>
+          <a:chOff x="0" y="0"/>
+          <a:chExt cx="0" cy="0"/>
+        </a:xfrm>
+      </p:grpSpPr>
+      <p:sp>
+        <p:nvSpPr>
+          <p:cNvPr id="2" name="Marcador de fecha 1">
+            <a:extLst>
+              <a:ext uri="{FF2B5EF4-FFF2-40B4-BE49-F238E27FC236}">
+                <a16:creationId xmlns:a16="http://schemas.microsoft.com/office/drawing/2014/main" id="{2C8D63E8-D259-E69F-184D-44D4CD17D6AA}"/>
+              </a:ext>
+            </a:extLst>
+          </p:cNvPr>
+          <p:cNvSpPr>
+            <a:spLocks noGrp="1"/>
+          </p:cNvSpPr>
+          <p:nvPr>
+            <p:ph type="dt" sz="half" idx="10"/>
+          </p:nvPr>
+        </p:nvSpPr>
+        <p:spPr/>
+        <p:txBody>
+          <a:bodyPr/>
+          <a:lstStyle/>
+          <a:p>
+            <a:r>
+              <a:rPr lang="es-ES"/>
+              <a:t>MSIE 2022-2023</a:t>
+            </a:r>
+            <a:endParaRPr lang="en-US" dirty="0"/>
+          </a:p>
+        </p:txBody>
+      </p:sp>
+      <p:sp>
+        <p:nvSpPr>
+          <p:cNvPr id="3" name="Marcador de pie de página 2">
+            <a:extLst>
+              <a:ext uri="{FF2B5EF4-FFF2-40B4-BE49-F238E27FC236}">
+                <a16:creationId xmlns:a16="http://schemas.microsoft.com/office/drawing/2014/main" id="{046334FD-D8CB-83CE-B06B-B6FB2CA703F6}"/>
+              </a:ext>
+            </a:extLst>
+          </p:cNvPr>
+          <p:cNvSpPr>
+            <a:spLocks noGrp="1"/>
+          </p:cNvSpPr>
+          <p:nvPr>
+            <p:ph type="ftr" sz="quarter" idx="11"/>
+          </p:nvPr>
+        </p:nvSpPr>
+        <p:spPr/>
+        <p:txBody>
+          <a:bodyPr/>
+          <a:lstStyle/>
+          <a:p>
+            <a:r>
+              <a:rPr lang="en-US"/>
+              <a:t>Testing and validation platforms - Architecture </a:t>
+            </a:r>
+            <a:endParaRPr lang="en-US" dirty="0"/>
+          </a:p>
+        </p:txBody>
+      </p:sp>
+      <p:sp>
+        <p:nvSpPr>
+          <p:cNvPr id="4" name="Marcador de número de diapositiva 3">
+            <a:extLst>
+              <a:ext uri="{FF2B5EF4-FFF2-40B4-BE49-F238E27FC236}">
+                <a16:creationId xmlns:a16="http://schemas.microsoft.com/office/drawing/2014/main" id="{F09EA907-5B8E-39B7-3DAE-9267CEA28EDE}"/>
+              </a:ext>
+            </a:extLst>
+          </p:cNvPr>
+          <p:cNvSpPr>
+            <a:spLocks noGrp="1"/>
+          </p:cNvSpPr>
+          <p:nvPr>
+            <p:ph type="sldNum" sz="quarter" idx="12"/>
+          </p:nvPr>
+        </p:nvSpPr>
+        <p:spPr/>
+        <p:txBody>
+          <a:bodyPr/>
+          <a:lstStyle/>
+          <a:p>
+            <a:fld id="{F7356FEA-1119-414E-9BDA-0F3F06B9EA58}" type="slidenum">
+              <a:rPr lang="en-US" smtClean="0"/>
+              <a:pPr/>
+              <a:t>20</a:t>
             </a:fld>
             <a:endParaRPr lang="en-US"/>
           </a:p>
@@ -10378,7 +10177,7 @@
 </p:sld>
 </file>
 
-<file path=ppt/slides/slide22.xml><?xml version="1.0" encoding="utf-8"?>
+<file path=ppt/slides/slide21.xml><?xml version="1.0" encoding="utf-8"?>
 <p:sld xmlns:a="http://schemas.openxmlformats.org/drawingml/2006/main" xmlns:r="http://schemas.openxmlformats.org/officeDocument/2006/relationships" xmlns:p="http://schemas.openxmlformats.org/presentationml/2006/main">
   <p:cSld>
     <p:spTree>
@@ -10477,7 +10276,7 @@
             <a:fld id="{F7356FEA-1119-414E-9BDA-0F3F06B9EA58}" type="slidenum">
               <a:rPr lang="en-US" smtClean="0"/>
               <a:pPr/>
-              <a:t>22</a:t>
+              <a:t>21</a:t>
             </a:fld>
             <a:endParaRPr lang="en-US"/>
           </a:p>
@@ -10737,6 +10536,222 @@
     <p:extLst>
       <p:ext uri="{BB962C8B-B14F-4D97-AF65-F5344CB8AC3E}">
         <p14:creationId xmlns:p14="http://schemas.microsoft.com/office/powerpoint/2010/main" val="41191375"/>
+      </p:ext>
+    </p:extLst>
+  </p:cSld>
+  <p:clrMapOvr>
+    <a:masterClrMapping/>
+  </p:clrMapOvr>
+</p:sld>
+</file>
+
+<file path=ppt/slides/slide22.xml><?xml version="1.0" encoding="utf-8"?>
+<p:sld xmlns:a="http://schemas.openxmlformats.org/drawingml/2006/main" xmlns:r="http://schemas.openxmlformats.org/officeDocument/2006/relationships" xmlns:p="http://schemas.openxmlformats.org/presentationml/2006/main">
+  <p:cSld>
+    <p:spTree>
+      <p:nvGrpSpPr>
+        <p:cNvPr id="1" name=""/>
+        <p:cNvGrpSpPr/>
+        <p:nvPr/>
+      </p:nvGrpSpPr>
+      <p:grpSpPr>
+        <a:xfrm>
+          <a:off x="0" y="0"/>
+          <a:ext cx="0" cy="0"/>
+          <a:chOff x="0" y="0"/>
+          <a:chExt cx="0" cy="0"/>
+        </a:xfrm>
+      </p:grpSpPr>
+      <p:sp>
+        <p:nvSpPr>
+          <p:cNvPr id="7" name="Título 6">
+            <a:extLst>
+              <a:ext uri="{FF2B5EF4-FFF2-40B4-BE49-F238E27FC236}">
+                <a16:creationId xmlns:a16="http://schemas.microsoft.com/office/drawing/2014/main" id="{237CCDA3-E1ED-9E94-E0B7-9B1C06D8E2D1}"/>
+              </a:ext>
+            </a:extLst>
+          </p:cNvPr>
+          <p:cNvSpPr>
+            <a:spLocks noGrp="1"/>
+          </p:cNvSpPr>
+          <p:nvPr>
+            <p:ph type="title"/>
+          </p:nvPr>
+        </p:nvSpPr>
+        <p:spPr/>
+        <p:txBody>
+          <a:bodyPr/>
+          <a:lstStyle/>
+          <a:p>
+            <a:r>
+              <a:rPr lang="es-ES" dirty="0" err="1"/>
+              <a:t>References</a:t>
+            </a:r>
+            <a:endParaRPr lang="en-GB" dirty="0"/>
+          </a:p>
+        </p:txBody>
+      </p:sp>
+      <p:sp>
+        <p:nvSpPr>
+          <p:cNvPr id="8" name="Marcador de texto 7">
+            <a:extLst>
+              <a:ext uri="{FF2B5EF4-FFF2-40B4-BE49-F238E27FC236}">
+                <a16:creationId xmlns:a16="http://schemas.microsoft.com/office/drawing/2014/main" id="{ECCD4CE4-23FE-7638-1B7E-1E90D91E724C}"/>
+              </a:ext>
+            </a:extLst>
+          </p:cNvPr>
+          <p:cNvSpPr>
+            <a:spLocks noGrp="1"/>
+          </p:cNvSpPr>
+          <p:nvPr>
+            <p:ph type="body" idx="1"/>
+          </p:nvPr>
+        </p:nvSpPr>
+        <p:spPr/>
+        <p:txBody>
+          <a:bodyPr/>
+          <a:lstStyle/>
+          <a:p>
+            <a:endParaRPr lang="en-GB"/>
+          </a:p>
+        </p:txBody>
+      </p:sp>
+      <p:sp>
+        <p:nvSpPr>
+          <p:cNvPr id="9" name="Marcador de contenido 8">
+            <a:extLst>
+              <a:ext uri="{FF2B5EF4-FFF2-40B4-BE49-F238E27FC236}">
+                <a16:creationId xmlns:a16="http://schemas.microsoft.com/office/drawing/2014/main" id="{AEC48370-F6C4-3BDC-BF0E-F82C9B0F78B4}"/>
+              </a:ext>
+            </a:extLst>
+          </p:cNvPr>
+          <p:cNvSpPr>
+            <a:spLocks noGrp="1"/>
+          </p:cNvSpPr>
+          <p:nvPr>
+            <p:ph sz="quarter" idx="10"/>
+          </p:nvPr>
+        </p:nvSpPr>
+        <p:spPr/>
+        <p:txBody>
+          <a:bodyPr/>
+          <a:lstStyle/>
+          <a:p>
+            <a:r>
+              <a:rPr lang="es-ES" dirty="0"/>
+              <a:t>3</a:t>
+            </a:r>
+            <a:endParaRPr lang="en-GB" dirty="0"/>
+          </a:p>
+        </p:txBody>
+      </p:sp>
+      <p:sp>
+        <p:nvSpPr>
+          <p:cNvPr id="2" name="Marcador de fecha 1">
+            <a:extLst>
+              <a:ext uri="{FF2B5EF4-FFF2-40B4-BE49-F238E27FC236}">
+                <a16:creationId xmlns:a16="http://schemas.microsoft.com/office/drawing/2014/main" id="{A22B642F-B36E-19DA-5846-612A3777CFC3}"/>
+              </a:ext>
+            </a:extLst>
+          </p:cNvPr>
+          <p:cNvSpPr>
+            <a:spLocks noGrp="1"/>
+          </p:cNvSpPr>
+          <p:nvPr>
+            <p:ph type="dt" sz="half" idx="4294967295"/>
+          </p:nvPr>
+        </p:nvSpPr>
+        <p:spPr>
+          <a:xfrm>
+            <a:off x="0" y="6467475"/>
+            <a:ext cx="1279525" cy="365125"/>
+          </a:xfrm>
+        </p:spPr>
+        <p:txBody>
+          <a:bodyPr/>
+          <a:lstStyle/>
+          <a:p>
+            <a:r>
+              <a:rPr lang="es-ES"/>
+              <a:t>MSIE 2022-2023</a:t>
+            </a:r>
+            <a:endParaRPr lang="en-US" dirty="0"/>
+          </a:p>
+        </p:txBody>
+      </p:sp>
+      <p:sp>
+        <p:nvSpPr>
+          <p:cNvPr id="3" name="Marcador de pie de página 2">
+            <a:extLst>
+              <a:ext uri="{FF2B5EF4-FFF2-40B4-BE49-F238E27FC236}">
+                <a16:creationId xmlns:a16="http://schemas.microsoft.com/office/drawing/2014/main" id="{9BBBC8D0-856A-0B38-3EE1-210D0971ACF2}"/>
+              </a:ext>
+            </a:extLst>
+          </p:cNvPr>
+          <p:cNvSpPr>
+            <a:spLocks noGrp="1"/>
+          </p:cNvSpPr>
+          <p:nvPr>
+            <p:ph type="ftr" sz="quarter" idx="4294967295"/>
+          </p:nvPr>
+        </p:nvSpPr>
+        <p:spPr>
+          <a:xfrm>
+            <a:off x="0" y="6461125"/>
+            <a:ext cx="5175250" cy="365125"/>
+          </a:xfrm>
+        </p:spPr>
+        <p:txBody>
+          <a:bodyPr/>
+          <a:lstStyle/>
+          <a:p>
+            <a:r>
+              <a:rPr lang="en-US"/>
+              <a:t>Testing and validation platforms - Architecture </a:t>
+            </a:r>
+            <a:endParaRPr lang="en-US" dirty="0"/>
+          </a:p>
+        </p:txBody>
+      </p:sp>
+      <p:sp>
+        <p:nvSpPr>
+          <p:cNvPr id="4" name="Marcador de número de diapositiva 3">
+            <a:extLst>
+              <a:ext uri="{FF2B5EF4-FFF2-40B4-BE49-F238E27FC236}">
+                <a16:creationId xmlns:a16="http://schemas.microsoft.com/office/drawing/2014/main" id="{99DB9FA2-6D5A-4D04-E967-7FC2114E44EB}"/>
+              </a:ext>
+            </a:extLst>
+          </p:cNvPr>
+          <p:cNvSpPr>
+            <a:spLocks noGrp="1"/>
+          </p:cNvSpPr>
+          <p:nvPr>
+            <p:ph type="sldNum" sz="quarter" idx="4294967295"/>
+          </p:nvPr>
+        </p:nvSpPr>
+        <p:spPr>
+          <a:xfrm>
+            <a:off x="8701088" y="6461125"/>
+            <a:ext cx="1204912" cy="365125"/>
+          </a:xfrm>
+        </p:spPr>
+        <p:txBody>
+          <a:bodyPr/>
+          <a:lstStyle/>
+          <a:p>
+            <a:fld id="{F7356FEA-1119-414E-9BDA-0F3F06B9EA58}" type="slidenum">
+              <a:rPr lang="en-US" smtClean="0"/>
+              <a:pPr/>
+              <a:t>22</a:t>
+            </a:fld>
+            <a:endParaRPr lang="en-US"/>
+          </a:p>
+        </p:txBody>
+      </p:sp>
+    </p:spTree>
+    <p:extLst>
+      <p:ext uri="{BB962C8B-B14F-4D97-AF65-F5344CB8AC3E}">
+        <p14:creationId xmlns:p14="http://schemas.microsoft.com/office/powerpoint/2010/main" val="3884177513"/>
       </p:ext>
     </p:extLst>
   </p:cSld>
@@ -10765,222 +10780,6 @@
       </p:grpSpPr>
       <p:sp>
         <p:nvSpPr>
-          <p:cNvPr id="7" name="Título 6">
-            <a:extLst>
-              <a:ext uri="{FF2B5EF4-FFF2-40B4-BE49-F238E27FC236}">
-                <a16:creationId xmlns:a16="http://schemas.microsoft.com/office/drawing/2014/main" id="{237CCDA3-E1ED-9E94-E0B7-9B1C06D8E2D1}"/>
-              </a:ext>
-            </a:extLst>
-          </p:cNvPr>
-          <p:cNvSpPr>
-            <a:spLocks noGrp="1"/>
-          </p:cNvSpPr>
-          <p:nvPr>
-            <p:ph type="title"/>
-          </p:nvPr>
-        </p:nvSpPr>
-        <p:spPr/>
-        <p:txBody>
-          <a:bodyPr/>
-          <a:lstStyle/>
-          <a:p>
-            <a:r>
-              <a:rPr lang="es-ES" dirty="0" err="1"/>
-              <a:t>References</a:t>
-            </a:r>
-            <a:endParaRPr lang="en-GB" dirty="0"/>
-          </a:p>
-        </p:txBody>
-      </p:sp>
-      <p:sp>
-        <p:nvSpPr>
-          <p:cNvPr id="8" name="Marcador de texto 7">
-            <a:extLst>
-              <a:ext uri="{FF2B5EF4-FFF2-40B4-BE49-F238E27FC236}">
-                <a16:creationId xmlns:a16="http://schemas.microsoft.com/office/drawing/2014/main" id="{ECCD4CE4-23FE-7638-1B7E-1E90D91E724C}"/>
-              </a:ext>
-            </a:extLst>
-          </p:cNvPr>
-          <p:cNvSpPr>
-            <a:spLocks noGrp="1"/>
-          </p:cNvSpPr>
-          <p:nvPr>
-            <p:ph type="body" idx="1"/>
-          </p:nvPr>
-        </p:nvSpPr>
-        <p:spPr/>
-        <p:txBody>
-          <a:bodyPr/>
-          <a:lstStyle/>
-          <a:p>
-            <a:endParaRPr lang="en-GB"/>
-          </a:p>
-        </p:txBody>
-      </p:sp>
-      <p:sp>
-        <p:nvSpPr>
-          <p:cNvPr id="9" name="Marcador de contenido 8">
-            <a:extLst>
-              <a:ext uri="{FF2B5EF4-FFF2-40B4-BE49-F238E27FC236}">
-                <a16:creationId xmlns:a16="http://schemas.microsoft.com/office/drawing/2014/main" id="{AEC48370-F6C4-3BDC-BF0E-F82C9B0F78B4}"/>
-              </a:ext>
-            </a:extLst>
-          </p:cNvPr>
-          <p:cNvSpPr>
-            <a:spLocks noGrp="1"/>
-          </p:cNvSpPr>
-          <p:nvPr>
-            <p:ph sz="quarter" idx="10"/>
-          </p:nvPr>
-        </p:nvSpPr>
-        <p:spPr/>
-        <p:txBody>
-          <a:bodyPr/>
-          <a:lstStyle/>
-          <a:p>
-            <a:r>
-              <a:rPr lang="es-ES" dirty="0"/>
-              <a:t>3</a:t>
-            </a:r>
-            <a:endParaRPr lang="en-GB" dirty="0"/>
-          </a:p>
-        </p:txBody>
-      </p:sp>
-      <p:sp>
-        <p:nvSpPr>
-          <p:cNvPr id="2" name="Marcador de fecha 1">
-            <a:extLst>
-              <a:ext uri="{FF2B5EF4-FFF2-40B4-BE49-F238E27FC236}">
-                <a16:creationId xmlns:a16="http://schemas.microsoft.com/office/drawing/2014/main" id="{A22B642F-B36E-19DA-5846-612A3777CFC3}"/>
-              </a:ext>
-            </a:extLst>
-          </p:cNvPr>
-          <p:cNvSpPr>
-            <a:spLocks noGrp="1"/>
-          </p:cNvSpPr>
-          <p:nvPr>
-            <p:ph type="dt" sz="half" idx="4294967295"/>
-          </p:nvPr>
-        </p:nvSpPr>
-        <p:spPr>
-          <a:xfrm>
-            <a:off x="0" y="6467475"/>
-            <a:ext cx="1279525" cy="365125"/>
-          </a:xfrm>
-        </p:spPr>
-        <p:txBody>
-          <a:bodyPr/>
-          <a:lstStyle/>
-          <a:p>
-            <a:r>
-              <a:rPr lang="es-ES"/>
-              <a:t>MSIE 2022-2023</a:t>
-            </a:r>
-            <a:endParaRPr lang="en-US" dirty="0"/>
-          </a:p>
-        </p:txBody>
-      </p:sp>
-      <p:sp>
-        <p:nvSpPr>
-          <p:cNvPr id="3" name="Marcador de pie de página 2">
-            <a:extLst>
-              <a:ext uri="{FF2B5EF4-FFF2-40B4-BE49-F238E27FC236}">
-                <a16:creationId xmlns:a16="http://schemas.microsoft.com/office/drawing/2014/main" id="{9BBBC8D0-856A-0B38-3EE1-210D0971ACF2}"/>
-              </a:ext>
-            </a:extLst>
-          </p:cNvPr>
-          <p:cNvSpPr>
-            <a:spLocks noGrp="1"/>
-          </p:cNvSpPr>
-          <p:nvPr>
-            <p:ph type="ftr" sz="quarter" idx="4294967295"/>
-          </p:nvPr>
-        </p:nvSpPr>
-        <p:spPr>
-          <a:xfrm>
-            <a:off x="0" y="6461125"/>
-            <a:ext cx="5175250" cy="365125"/>
-          </a:xfrm>
-        </p:spPr>
-        <p:txBody>
-          <a:bodyPr/>
-          <a:lstStyle/>
-          <a:p>
-            <a:r>
-              <a:rPr lang="en-US"/>
-              <a:t>Testing and validation platforms - Architecture </a:t>
-            </a:r>
-            <a:endParaRPr lang="en-US" dirty="0"/>
-          </a:p>
-        </p:txBody>
-      </p:sp>
-      <p:sp>
-        <p:nvSpPr>
-          <p:cNvPr id="4" name="Marcador de número de diapositiva 3">
-            <a:extLst>
-              <a:ext uri="{FF2B5EF4-FFF2-40B4-BE49-F238E27FC236}">
-                <a16:creationId xmlns:a16="http://schemas.microsoft.com/office/drawing/2014/main" id="{99DB9FA2-6D5A-4D04-E967-7FC2114E44EB}"/>
-              </a:ext>
-            </a:extLst>
-          </p:cNvPr>
-          <p:cNvSpPr>
-            <a:spLocks noGrp="1"/>
-          </p:cNvSpPr>
-          <p:nvPr>
-            <p:ph type="sldNum" sz="quarter" idx="4294967295"/>
-          </p:nvPr>
-        </p:nvSpPr>
-        <p:spPr>
-          <a:xfrm>
-            <a:off x="8701088" y="6461125"/>
-            <a:ext cx="1204912" cy="365125"/>
-          </a:xfrm>
-        </p:spPr>
-        <p:txBody>
-          <a:bodyPr/>
-          <a:lstStyle/>
-          <a:p>
-            <a:fld id="{F7356FEA-1119-414E-9BDA-0F3F06B9EA58}" type="slidenum">
-              <a:rPr lang="en-US" smtClean="0"/>
-              <a:pPr/>
-              <a:t>23</a:t>
-            </a:fld>
-            <a:endParaRPr lang="en-US"/>
-          </a:p>
-        </p:txBody>
-      </p:sp>
-    </p:spTree>
-    <p:extLst>
-      <p:ext uri="{BB962C8B-B14F-4D97-AF65-F5344CB8AC3E}">
-        <p14:creationId xmlns:p14="http://schemas.microsoft.com/office/powerpoint/2010/main" val="3884177513"/>
-      </p:ext>
-    </p:extLst>
-  </p:cSld>
-  <p:clrMapOvr>
-    <a:masterClrMapping/>
-  </p:clrMapOvr>
-</p:sld>
-</file>
-
-<file path=ppt/slides/slide24.xml><?xml version="1.0" encoding="utf-8"?>
-<p:sld xmlns:a="http://schemas.openxmlformats.org/drawingml/2006/main" xmlns:r="http://schemas.openxmlformats.org/officeDocument/2006/relationships" xmlns:p="http://schemas.openxmlformats.org/presentationml/2006/main">
-  <p:cSld>
-    <p:spTree>
-      <p:nvGrpSpPr>
-        <p:cNvPr id="1" name=""/>
-        <p:cNvGrpSpPr/>
-        <p:nvPr/>
-      </p:nvGrpSpPr>
-      <p:grpSpPr>
-        <a:xfrm>
-          <a:off x="0" y="0"/>
-          <a:ext cx="0" cy="0"/>
-          <a:chOff x="0" y="0"/>
-          <a:chExt cx="0" cy="0"/>
-        </a:xfrm>
-      </p:grpSpPr>
-      <p:sp>
-        <p:nvSpPr>
           <p:cNvPr id="2" name="Marcador de fecha 1">
             <a:extLst>
               <a:ext uri="{FF2B5EF4-FFF2-40B4-BE49-F238E27FC236}">
@@ -11061,7 +10860,7 @@
             <a:fld id="{F7356FEA-1119-414E-9BDA-0F3F06B9EA58}" type="slidenum">
               <a:rPr lang="en-US" smtClean="0"/>
               <a:pPr/>
-              <a:t>24</a:t>
+              <a:t>23</a:t>
             </a:fld>
             <a:endParaRPr lang="en-US"/>
           </a:p>
@@ -11388,7 +11187,7 @@
 </p:sld>
 </file>
 
-<file path=ppt/slides/slide25.xml><?xml version="1.0" encoding="utf-8"?>
+<file path=ppt/slides/slide24.xml><?xml version="1.0" encoding="utf-8"?>
 <p:sld xmlns:a="http://schemas.openxmlformats.org/drawingml/2006/main" xmlns:r="http://schemas.openxmlformats.org/officeDocument/2006/relationships" xmlns:p="http://schemas.openxmlformats.org/presentationml/2006/main">
   <p:cSld>
     <p:spTree>

</xml_diff>